<commit_message>
added reduce and transform_reduce
</commit_message>
<xml_diff>
--- a/doxygen/images/figures.pptx
+++ b/doxygen/images/figures.pptx
@@ -259,7 +259,7 @@
           <a:p>
             <a:fld id="{04829EDC-779A-D243-B308-B23C15C64251}" type="datetimeFigureOut">
               <a:rPr lang="en-US" smtClean="0"/>
-              <a:t>8/13/20</a:t>
+              <a:t>8/19/20</a:t>
             </a:fld>
             <a:endParaRPr lang="en-US"/>
           </a:p>
@@ -457,7 +457,7 @@
           <a:p>
             <a:fld id="{04829EDC-779A-D243-B308-B23C15C64251}" type="datetimeFigureOut">
               <a:rPr lang="en-US" smtClean="0"/>
-              <a:t>8/13/20</a:t>
+              <a:t>8/19/20</a:t>
             </a:fld>
             <a:endParaRPr lang="en-US"/>
           </a:p>
@@ -665,7 +665,7 @@
           <a:p>
             <a:fld id="{04829EDC-779A-D243-B308-B23C15C64251}" type="datetimeFigureOut">
               <a:rPr lang="en-US" smtClean="0"/>
-              <a:t>8/13/20</a:t>
+              <a:t>8/19/20</a:t>
             </a:fld>
             <a:endParaRPr lang="en-US"/>
           </a:p>
@@ -863,7 +863,7 @@
           <a:p>
             <a:fld id="{04829EDC-779A-D243-B308-B23C15C64251}" type="datetimeFigureOut">
               <a:rPr lang="en-US" smtClean="0"/>
-              <a:t>8/13/20</a:t>
+              <a:t>8/19/20</a:t>
             </a:fld>
             <a:endParaRPr lang="en-US"/>
           </a:p>
@@ -1138,7 +1138,7 @@
           <a:p>
             <a:fld id="{04829EDC-779A-D243-B308-B23C15C64251}" type="datetimeFigureOut">
               <a:rPr lang="en-US" smtClean="0"/>
-              <a:t>8/13/20</a:t>
+              <a:t>8/19/20</a:t>
             </a:fld>
             <a:endParaRPr lang="en-US"/>
           </a:p>
@@ -1403,7 +1403,7 @@
           <a:p>
             <a:fld id="{04829EDC-779A-D243-B308-B23C15C64251}" type="datetimeFigureOut">
               <a:rPr lang="en-US" smtClean="0"/>
-              <a:t>8/13/20</a:t>
+              <a:t>8/19/20</a:t>
             </a:fld>
             <a:endParaRPr lang="en-US"/>
           </a:p>
@@ -1815,7 +1815,7 @@
           <a:p>
             <a:fld id="{04829EDC-779A-D243-B308-B23C15C64251}" type="datetimeFigureOut">
               <a:rPr lang="en-US" smtClean="0"/>
-              <a:t>8/13/20</a:t>
+              <a:t>8/19/20</a:t>
             </a:fld>
             <a:endParaRPr lang="en-US"/>
           </a:p>
@@ -1956,7 +1956,7 @@
           <a:p>
             <a:fld id="{04829EDC-779A-D243-B308-B23C15C64251}" type="datetimeFigureOut">
               <a:rPr lang="en-US" smtClean="0"/>
-              <a:t>8/13/20</a:t>
+              <a:t>8/19/20</a:t>
             </a:fld>
             <a:endParaRPr lang="en-US"/>
           </a:p>
@@ -2069,7 +2069,7 @@
           <a:p>
             <a:fld id="{04829EDC-779A-D243-B308-B23C15C64251}" type="datetimeFigureOut">
               <a:rPr lang="en-US" smtClean="0"/>
-              <a:t>8/13/20</a:t>
+              <a:t>8/19/20</a:t>
             </a:fld>
             <a:endParaRPr lang="en-US"/>
           </a:p>
@@ -2380,7 +2380,7 @@
           <a:p>
             <a:fld id="{04829EDC-779A-D243-B308-B23C15C64251}" type="datetimeFigureOut">
               <a:rPr lang="en-US" smtClean="0"/>
-              <a:t>8/13/20</a:t>
+              <a:t>8/19/20</a:t>
             </a:fld>
             <a:endParaRPr lang="en-US"/>
           </a:p>
@@ -2668,7 +2668,7 @@
           <a:p>
             <a:fld id="{04829EDC-779A-D243-B308-B23C15C64251}" type="datetimeFigureOut">
               <a:rPr lang="en-US" smtClean="0"/>
-              <a:t>8/13/20</a:t>
+              <a:t>8/19/20</a:t>
             </a:fld>
             <a:endParaRPr lang="en-US"/>
           </a:p>
@@ -2909,7 +2909,7 @@
           <a:p>
             <a:fld id="{04829EDC-779A-D243-B308-B23C15C64251}" type="datetimeFigureOut">
               <a:rPr lang="en-US" smtClean="0"/>
-              <a:t>8/13/20</a:t>
+              <a:t>8/19/20</a:t>
             </a:fld>
             <a:endParaRPr lang="en-US"/>
           </a:p>
@@ -3328,10 +3328,10 @@
       </p:grpSpPr>
       <p:sp>
         <p:nvSpPr>
-          <p:cNvPr id="4" name="Rectangle 3">
-            <a:extLst>
-              <a:ext uri="{FF2B5EF4-FFF2-40B4-BE49-F238E27FC236}">
-                <a16:creationId xmlns:a16="http://schemas.microsoft.com/office/drawing/2014/main" id="{D2BB76DC-4D75-B54C-BDA2-36E3F6F61606}"/>
+          <p:cNvPr id="42" name="Rectangle 41">
+            <a:extLst>
+              <a:ext uri="{FF2B5EF4-FFF2-40B4-BE49-F238E27FC236}">
+                <a16:creationId xmlns:a16="http://schemas.microsoft.com/office/drawing/2014/main" id="{1593262C-9ABB-0649-80B9-817506FE100B}"/>
               </a:ext>
             </a:extLst>
           </p:cNvPr>
@@ -3340,1942 +3340,45 @@
         </p:nvSpPr>
         <p:spPr>
           <a:xfrm>
-            <a:off x="444570" y="1140430"/>
-            <a:ext cx="2727790" cy="431515"/>
+            <a:off x="308222" y="1975222"/>
+            <a:ext cx="11609797" cy="1017141"/>
           </a:xfrm>
           <a:prstGeom prst="rect">
             <a:avLst/>
           </a:prstGeom>
-          <a:solidFill>
-            <a:schemeClr val="bg1">
-              <a:lumMod val="95000"/>
-            </a:schemeClr>
-          </a:solidFill>
-          <a:ln w="19050">
-            <a:solidFill>
-              <a:schemeClr val="tx1"/>
-            </a:solidFill>
-          </a:ln>
+          <a:noFill/>
+          <a:ln w="19050"/>
         </p:spPr>
         <p:style>
           <a:lnRef idx="2">
-            <a:schemeClr val="accent1">
-              <a:shade val="50000"/>
-            </a:schemeClr>
+            <a:schemeClr val="dk1"/>
           </a:lnRef>
           <a:fillRef idx="1">
-            <a:schemeClr val="accent1"/>
+            <a:schemeClr val="lt1"/>
           </a:fillRef>
           <a:effectRef idx="0">
-            <a:schemeClr val="accent1"/>
+            <a:schemeClr val="dk1"/>
           </a:effectRef>
           <a:fontRef idx="minor">
-            <a:schemeClr val="lt1"/>
+            <a:schemeClr val="dk1"/>
           </a:fontRef>
         </p:style>
         <p:txBody>
           <a:bodyPr rtlCol="0" anchor="ctr"/>
           <a:lstStyle/>
           <a:p>
+            <a:r>
+              <a:rPr lang="en-US" sz="2000" dirty="0"/>
+              <a:t>Static partition with chunk size &gt; 0</a:t>
+            </a:r>
+          </a:p>
+          <a:p>
             <a:pPr algn="ctr"/>
-            <a:r>
-              <a:rPr lang="en-US" sz="2000" dirty="0">
-                <a:solidFill>
-                  <a:schemeClr val="tx1"/>
-                </a:solidFill>
-              </a:rPr>
-              <a:t>Task 1</a:t>
-            </a:r>
-          </a:p>
-        </p:txBody>
-      </p:sp>
-      <p:sp>
-        <p:nvSpPr>
-          <p:cNvPr id="5" name="Rectangle 4">
-            <a:extLst>
-              <a:ext uri="{FF2B5EF4-FFF2-40B4-BE49-F238E27FC236}">
-                <a16:creationId xmlns:a16="http://schemas.microsoft.com/office/drawing/2014/main" id="{D2A41FFB-C265-3543-84B4-59DF1A7E540E}"/>
-              </a:ext>
-            </a:extLst>
-          </p:cNvPr>
-          <p:cNvSpPr/>
-          <p:nvPr/>
-        </p:nvSpPr>
-        <p:spPr>
-          <a:xfrm>
-            <a:off x="3321121" y="1140430"/>
-            <a:ext cx="2727790" cy="431515"/>
-          </a:xfrm>
-          <a:prstGeom prst="rect">
-            <a:avLst/>
-          </a:prstGeom>
-          <a:solidFill>
-            <a:schemeClr val="bg1">
-              <a:lumMod val="85000"/>
-            </a:schemeClr>
-          </a:solidFill>
-          <a:ln w="19050">
-            <a:solidFill>
-              <a:schemeClr val="tx1"/>
-            </a:solidFill>
-          </a:ln>
-        </p:spPr>
-        <p:style>
-          <a:lnRef idx="2">
-            <a:schemeClr val="accent1">
-              <a:shade val="50000"/>
-            </a:schemeClr>
-          </a:lnRef>
-          <a:fillRef idx="1">
-            <a:schemeClr val="accent1"/>
-          </a:fillRef>
-          <a:effectRef idx="0">
-            <a:schemeClr val="accent1"/>
-          </a:effectRef>
-          <a:fontRef idx="minor">
-            <a:schemeClr val="lt1"/>
-          </a:fontRef>
-        </p:style>
-        <p:txBody>
-          <a:bodyPr rtlCol="0" anchor="ctr"/>
-          <a:lstStyle/>
+            <a:endParaRPr lang="en-US" dirty="0"/>
+          </a:p>
           <a:p>
             <a:pPr algn="ctr"/>
-            <a:r>
-              <a:rPr lang="en-US" sz="2000" dirty="0">
-                <a:solidFill>
-                  <a:schemeClr val="tx1"/>
-                </a:solidFill>
-              </a:rPr>
-              <a:t>Task 2</a:t>
-            </a:r>
-          </a:p>
-        </p:txBody>
-      </p:sp>
-      <p:sp>
-        <p:nvSpPr>
-          <p:cNvPr id="6" name="Rectangle 5">
-            <a:extLst>
-              <a:ext uri="{FF2B5EF4-FFF2-40B4-BE49-F238E27FC236}">
-                <a16:creationId xmlns:a16="http://schemas.microsoft.com/office/drawing/2014/main" id="{9EE3F200-E502-3E47-A387-410608F33FB0}"/>
-              </a:ext>
-            </a:extLst>
-          </p:cNvPr>
-          <p:cNvSpPr/>
-          <p:nvPr/>
-        </p:nvSpPr>
-        <p:spPr>
-          <a:xfrm>
-            <a:off x="6197672" y="1140430"/>
-            <a:ext cx="2727790" cy="431515"/>
-          </a:xfrm>
-          <a:prstGeom prst="rect">
-            <a:avLst/>
-          </a:prstGeom>
-          <a:solidFill>
-            <a:schemeClr val="bg1">
-              <a:lumMod val="75000"/>
-            </a:schemeClr>
-          </a:solidFill>
-          <a:ln w="19050">
-            <a:solidFill>
-              <a:schemeClr val="tx1"/>
-            </a:solidFill>
-          </a:ln>
-        </p:spPr>
-        <p:style>
-          <a:lnRef idx="2">
-            <a:schemeClr val="accent1">
-              <a:shade val="50000"/>
-            </a:schemeClr>
-          </a:lnRef>
-          <a:fillRef idx="1">
-            <a:schemeClr val="accent1"/>
-          </a:fillRef>
-          <a:effectRef idx="0">
-            <a:schemeClr val="accent1"/>
-          </a:effectRef>
-          <a:fontRef idx="minor">
-            <a:schemeClr val="lt1"/>
-          </a:fontRef>
-        </p:style>
-        <p:txBody>
-          <a:bodyPr rtlCol="0" anchor="ctr"/>
-          <a:lstStyle/>
-          <a:p>
-            <a:pPr algn="ctr"/>
-            <a:r>
-              <a:rPr lang="en-US" sz="2000" dirty="0">
-                <a:solidFill>
-                  <a:schemeClr val="tx1"/>
-                </a:solidFill>
-              </a:rPr>
-              <a:t>Task 3</a:t>
-            </a:r>
-          </a:p>
-        </p:txBody>
-      </p:sp>
-      <p:sp>
-        <p:nvSpPr>
-          <p:cNvPr id="7" name="Rectangle 6">
-            <a:extLst>
-              <a:ext uri="{FF2B5EF4-FFF2-40B4-BE49-F238E27FC236}">
-                <a16:creationId xmlns:a16="http://schemas.microsoft.com/office/drawing/2014/main" id="{074AC4B3-97AC-7040-A44B-B98C894606BA}"/>
-              </a:ext>
-            </a:extLst>
-          </p:cNvPr>
-          <p:cNvSpPr/>
-          <p:nvPr/>
-        </p:nvSpPr>
-        <p:spPr>
-          <a:xfrm>
-            <a:off x="9074223" y="1140430"/>
-            <a:ext cx="2727790" cy="431515"/>
-          </a:xfrm>
-          <a:prstGeom prst="rect">
-            <a:avLst/>
-          </a:prstGeom>
-          <a:solidFill>
-            <a:schemeClr val="bg1">
-              <a:lumMod val="50000"/>
-            </a:schemeClr>
-          </a:solidFill>
-          <a:ln w="19050">
-            <a:solidFill>
-              <a:schemeClr val="tx1"/>
-            </a:solidFill>
-          </a:ln>
-        </p:spPr>
-        <p:style>
-          <a:lnRef idx="2">
-            <a:schemeClr val="accent1">
-              <a:shade val="50000"/>
-            </a:schemeClr>
-          </a:lnRef>
-          <a:fillRef idx="1">
-            <a:schemeClr val="accent1"/>
-          </a:fillRef>
-          <a:effectRef idx="0">
-            <a:schemeClr val="accent1"/>
-          </a:effectRef>
-          <a:fontRef idx="minor">
-            <a:schemeClr val="lt1"/>
-          </a:fontRef>
-        </p:style>
-        <p:txBody>
-          <a:bodyPr rtlCol="0" anchor="ctr"/>
-          <a:lstStyle/>
-          <a:p>
-            <a:pPr algn="ctr"/>
-            <a:r>
-              <a:rPr lang="en-US" sz="2000" dirty="0">
-                <a:solidFill>
-                  <a:schemeClr val="tx1"/>
-                </a:solidFill>
-              </a:rPr>
-              <a:t>Task 4</a:t>
-            </a:r>
-          </a:p>
-        </p:txBody>
-      </p:sp>
-      <p:sp>
-        <p:nvSpPr>
-          <p:cNvPr id="8" name="Rectangle 7">
-            <a:extLst>
-              <a:ext uri="{FF2B5EF4-FFF2-40B4-BE49-F238E27FC236}">
-                <a16:creationId xmlns:a16="http://schemas.microsoft.com/office/drawing/2014/main" id="{4F9DA6FF-F653-9545-BE52-1A9BCB7B22CF}"/>
-              </a:ext>
-            </a:extLst>
-          </p:cNvPr>
-          <p:cNvSpPr/>
-          <p:nvPr/>
-        </p:nvSpPr>
-        <p:spPr>
-          <a:xfrm>
-            <a:off x="444570" y="3749231"/>
-            <a:ext cx="1302037" cy="431515"/>
-          </a:xfrm>
-          <a:prstGeom prst="rect">
-            <a:avLst/>
-          </a:prstGeom>
-          <a:solidFill>
-            <a:schemeClr val="bg1">
-              <a:lumMod val="95000"/>
-            </a:schemeClr>
-          </a:solidFill>
-          <a:ln w="19050">
-            <a:solidFill>
-              <a:schemeClr val="tx1"/>
-            </a:solidFill>
-          </a:ln>
-        </p:spPr>
-        <p:style>
-          <a:lnRef idx="2">
-            <a:schemeClr val="accent1">
-              <a:shade val="50000"/>
-            </a:schemeClr>
-          </a:lnRef>
-          <a:fillRef idx="1">
-            <a:schemeClr val="accent1"/>
-          </a:fillRef>
-          <a:effectRef idx="0">
-            <a:schemeClr val="accent1"/>
-          </a:effectRef>
-          <a:fontRef idx="minor">
-            <a:schemeClr val="lt1"/>
-          </a:fontRef>
-        </p:style>
-        <p:txBody>
-          <a:bodyPr rtlCol="0" anchor="ctr"/>
-          <a:lstStyle/>
-          <a:p>
-            <a:pPr algn="ctr"/>
-            <a:r>
-              <a:rPr lang="en-US" sz="2000" dirty="0">
-                <a:solidFill>
-                  <a:schemeClr val="tx1"/>
-                </a:solidFill>
-              </a:rPr>
-              <a:t>Task 1</a:t>
-            </a:r>
-          </a:p>
-        </p:txBody>
-      </p:sp>
-      <p:sp>
-        <p:nvSpPr>
-          <p:cNvPr id="9" name="Rectangle 8">
-            <a:extLst>
-              <a:ext uri="{FF2B5EF4-FFF2-40B4-BE49-F238E27FC236}">
-                <a16:creationId xmlns:a16="http://schemas.microsoft.com/office/drawing/2014/main" id="{D09C8341-B720-1B4F-8181-A813D095C4AD}"/>
-              </a:ext>
-            </a:extLst>
-          </p:cNvPr>
-          <p:cNvSpPr/>
-          <p:nvPr/>
-        </p:nvSpPr>
-        <p:spPr>
-          <a:xfrm>
-            <a:off x="444570" y="2432421"/>
-            <a:ext cx="973903" cy="431515"/>
-          </a:xfrm>
-          <a:prstGeom prst="rect">
-            <a:avLst/>
-          </a:prstGeom>
-          <a:solidFill>
-            <a:schemeClr val="bg1">
-              <a:lumMod val="95000"/>
-            </a:schemeClr>
-          </a:solidFill>
-          <a:ln w="19050">
-            <a:solidFill>
-              <a:schemeClr val="tx1"/>
-            </a:solidFill>
-          </a:ln>
-        </p:spPr>
-        <p:style>
-          <a:lnRef idx="2">
-            <a:schemeClr val="accent1">
-              <a:shade val="50000"/>
-            </a:schemeClr>
-          </a:lnRef>
-          <a:fillRef idx="1">
-            <a:schemeClr val="accent1"/>
-          </a:fillRef>
-          <a:effectRef idx="0">
-            <a:schemeClr val="accent1"/>
-          </a:effectRef>
-          <a:fontRef idx="minor">
-            <a:schemeClr val="lt1"/>
-          </a:fontRef>
-        </p:style>
-        <p:txBody>
-          <a:bodyPr rtlCol="0" anchor="ctr"/>
-          <a:lstStyle/>
-          <a:p>
-            <a:pPr algn="ctr"/>
-            <a:r>
-              <a:rPr lang="en-US" sz="2000" dirty="0">
-                <a:solidFill>
-                  <a:schemeClr val="tx1"/>
-                </a:solidFill>
-              </a:rPr>
-              <a:t>Task 1</a:t>
-            </a:r>
-          </a:p>
-        </p:txBody>
-      </p:sp>
-      <p:sp>
-        <p:nvSpPr>
-          <p:cNvPr id="10" name="Rectangle 9">
-            <a:extLst>
-              <a:ext uri="{FF2B5EF4-FFF2-40B4-BE49-F238E27FC236}">
-                <a16:creationId xmlns:a16="http://schemas.microsoft.com/office/drawing/2014/main" id="{AD7C6028-A883-0C47-B71A-3CA50AB724B5}"/>
-              </a:ext>
-            </a:extLst>
-          </p:cNvPr>
-          <p:cNvSpPr/>
-          <p:nvPr/>
-        </p:nvSpPr>
-        <p:spPr>
-          <a:xfrm>
-            <a:off x="1553966" y="2432421"/>
-            <a:ext cx="973903" cy="431515"/>
-          </a:xfrm>
-          <a:prstGeom prst="rect">
-            <a:avLst/>
-          </a:prstGeom>
-          <a:solidFill>
-            <a:schemeClr val="bg1">
-              <a:lumMod val="85000"/>
-            </a:schemeClr>
-          </a:solidFill>
-          <a:ln w="19050">
-            <a:solidFill>
-              <a:schemeClr val="tx1"/>
-            </a:solidFill>
-          </a:ln>
-        </p:spPr>
-        <p:style>
-          <a:lnRef idx="2">
-            <a:schemeClr val="accent1">
-              <a:shade val="50000"/>
-            </a:schemeClr>
-          </a:lnRef>
-          <a:fillRef idx="1">
-            <a:schemeClr val="accent1"/>
-          </a:fillRef>
-          <a:effectRef idx="0">
-            <a:schemeClr val="accent1"/>
-          </a:effectRef>
-          <a:fontRef idx="minor">
-            <a:schemeClr val="lt1"/>
-          </a:fontRef>
-        </p:style>
-        <p:txBody>
-          <a:bodyPr rtlCol="0" anchor="ctr"/>
-          <a:lstStyle/>
-          <a:p>
-            <a:pPr algn="ctr"/>
-            <a:r>
-              <a:rPr lang="en-US" sz="2000" dirty="0">
-                <a:solidFill>
-                  <a:schemeClr val="tx1"/>
-                </a:solidFill>
-              </a:rPr>
-              <a:t>Task 2</a:t>
-            </a:r>
-          </a:p>
-        </p:txBody>
-      </p:sp>
-      <p:sp>
-        <p:nvSpPr>
-          <p:cNvPr id="11" name="Rectangle 10">
-            <a:extLst>
-              <a:ext uri="{FF2B5EF4-FFF2-40B4-BE49-F238E27FC236}">
-                <a16:creationId xmlns:a16="http://schemas.microsoft.com/office/drawing/2014/main" id="{4DE9CF44-7177-584F-90C6-730CCA972ED0}"/>
-              </a:ext>
-            </a:extLst>
-          </p:cNvPr>
-          <p:cNvSpPr/>
-          <p:nvPr/>
-        </p:nvSpPr>
-        <p:spPr>
-          <a:xfrm>
-            <a:off x="2663362" y="2432421"/>
-            <a:ext cx="973903" cy="431515"/>
-          </a:xfrm>
-          <a:prstGeom prst="rect">
-            <a:avLst/>
-          </a:prstGeom>
-          <a:solidFill>
-            <a:schemeClr val="bg1">
-              <a:lumMod val="75000"/>
-            </a:schemeClr>
-          </a:solidFill>
-          <a:ln w="19050">
-            <a:solidFill>
-              <a:schemeClr val="tx1"/>
-            </a:solidFill>
-          </a:ln>
-        </p:spPr>
-        <p:style>
-          <a:lnRef idx="2">
-            <a:schemeClr val="accent1">
-              <a:shade val="50000"/>
-            </a:schemeClr>
-          </a:lnRef>
-          <a:fillRef idx="1">
-            <a:schemeClr val="accent1"/>
-          </a:fillRef>
-          <a:effectRef idx="0">
-            <a:schemeClr val="accent1"/>
-          </a:effectRef>
-          <a:fontRef idx="minor">
-            <a:schemeClr val="lt1"/>
-          </a:fontRef>
-        </p:style>
-        <p:txBody>
-          <a:bodyPr rtlCol="0" anchor="ctr"/>
-          <a:lstStyle/>
-          <a:p>
-            <a:pPr algn="ctr"/>
-            <a:r>
-              <a:rPr lang="en-US" sz="2000" dirty="0">
-                <a:solidFill>
-                  <a:schemeClr val="tx1"/>
-                </a:solidFill>
-              </a:rPr>
-              <a:t>Task 3</a:t>
-            </a:r>
-          </a:p>
-        </p:txBody>
-      </p:sp>
-      <p:sp>
-        <p:nvSpPr>
-          <p:cNvPr id="12" name="Rectangle 11">
-            <a:extLst>
-              <a:ext uri="{FF2B5EF4-FFF2-40B4-BE49-F238E27FC236}">
-                <a16:creationId xmlns:a16="http://schemas.microsoft.com/office/drawing/2014/main" id="{755837B1-0036-CA49-A5A6-96A83959452C}"/>
-              </a:ext>
-            </a:extLst>
-          </p:cNvPr>
-          <p:cNvSpPr/>
-          <p:nvPr/>
-        </p:nvSpPr>
-        <p:spPr>
-          <a:xfrm>
-            <a:off x="3772758" y="2432421"/>
-            <a:ext cx="973903" cy="431515"/>
-          </a:xfrm>
-          <a:prstGeom prst="rect">
-            <a:avLst/>
-          </a:prstGeom>
-          <a:solidFill>
-            <a:schemeClr val="bg1">
-              <a:lumMod val="50000"/>
-            </a:schemeClr>
-          </a:solidFill>
-          <a:ln w="19050">
-            <a:solidFill>
-              <a:schemeClr val="tx1"/>
-            </a:solidFill>
-          </a:ln>
-        </p:spPr>
-        <p:style>
-          <a:lnRef idx="2">
-            <a:schemeClr val="accent1">
-              <a:shade val="50000"/>
-            </a:schemeClr>
-          </a:lnRef>
-          <a:fillRef idx="1">
-            <a:schemeClr val="accent1"/>
-          </a:fillRef>
-          <a:effectRef idx="0">
-            <a:schemeClr val="accent1"/>
-          </a:effectRef>
-          <a:fontRef idx="minor">
-            <a:schemeClr val="lt1"/>
-          </a:fontRef>
-        </p:style>
-        <p:txBody>
-          <a:bodyPr rtlCol="0" anchor="ctr"/>
-          <a:lstStyle/>
-          <a:p>
-            <a:pPr algn="ctr"/>
-            <a:r>
-              <a:rPr lang="en-US" sz="2000" dirty="0">
-                <a:solidFill>
-                  <a:schemeClr val="tx1"/>
-                </a:solidFill>
-              </a:rPr>
-              <a:t>Task 4</a:t>
-            </a:r>
-          </a:p>
-        </p:txBody>
-      </p:sp>
-      <p:sp>
-        <p:nvSpPr>
-          <p:cNvPr id="13" name="Rectangle 12">
-            <a:extLst>
-              <a:ext uri="{FF2B5EF4-FFF2-40B4-BE49-F238E27FC236}">
-                <a16:creationId xmlns:a16="http://schemas.microsoft.com/office/drawing/2014/main" id="{C2BAC4D1-09B2-8F46-BB36-2982EE5498DB}"/>
-              </a:ext>
-            </a:extLst>
-          </p:cNvPr>
-          <p:cNvSpPr/>
-          <p:nvPr/>
-        </p:nvSpPr>
-        <p:spPr>
-          <a:xfrm>
-            <a:off x="5017647" y="2432421"/>
-            <a:ext cx="973903" cy="431515"/>
-          </a:xfrm>
-          <a:prstGeom prst="rect">
-            <a:avLst/>
-          </a:prstGeom>
-          <a:solidFill>
-            <a:schemeClr val="bg1">
-              <a:lumMod val="95000"/>
-            </a:schemeClr>
-          </a:solidFill>
-          <a:ln w="19050">
-            <a:solidFill>
-              <a:schemeClr val="tx1"/>
-            </a:solidFill>
-          </a:ln>
-        </p:spPr>
-        <p:style>
-          <a:lnRef idx="2">
-            <a:schemeClr val="accent1">
-              <a:shade val="50000"/>
-            </a:schemeClr>
-          </a:lnRef>
-          <a:fillRef idx="1">
-            <a:schemeClr val="accent1"/>
-          </a:fillRef>
-          <a:effectRef idx="0">
-            <a:schemeClr val="accent1"/>
-          </a:effectRef>
-          <a:fontRef idx="minor">
-            <a:schemeClr val="lt1"/>
-          </a:fontRef>
-        </p:style>
-        <p:txBody>
-          <a:bodyPr rtlCol="0" anchor="ctr"/>
-          <a:lstStyle/>
-          <a:p>
-            <a:pPr algn="ctr"/>
-            <a:r>
-              <a:rPr lang="en-US" sz="2000" dirty="0">
-                <a:solidFill>
-                  <a:schemeClr val="tx1"/>
-                </a:solidFill>
-              </a:rPr>
-              <a:t>Task 5</a:t>
-            </a:r>
-          </a:p>
-        </p:txBody>
-      </p:sp>
-      <p:sp>
-        <p:nvSpPr>
-          <p:cNvPr id="14" name="Rectangle 13">
-            <a:extLst>
-              <a:ext uri="{FF2B5EF4-FFF2-40B4-BE49-F238E27FC236}">
-                <a16:creationId xmlns:a16="http://schemas.microsoft.com/office/drawing/2014/main" id="{9FF9EE6A-28F3-8645-9B12-E1E076B68F9A}"/>
-              </a:ext>
-            </a:extLst>
-          </p:cNvPr>
-          <p:cNvSpPr/>
-          <p:nvPr/>
-        </p:nvSpPr>
-        <p:spPr>
-          <a:xfrm>
-            <a:off x="6157865" y="2432421"/>
-            <a:ext cx="973903" cy="431515"/>
-          </a:xfrm>
-          <a:prstGeom prst="rect">
-            <a:avLst/>
-          </a:prstGeom>
-          <a:solidFill>
-            <a:schemeClr val="bg1">
-              <a:lumMod val="85000"/>
-            </a:schemeClr>
-          </a:solidFill>
-          <a:ln w="19050">
-            <a:solidFill>
-              <a:schemeClr val="tx1"/>
-            </a:solidFill>
-          </a:ln>
-        </p:spPr>
-        <p:style>
-          <a:lnRef idx="2">
-            <a:schemeClr val="accent1">
-              <a:shade val="50000"/>
-            </a:schemeClr>
-          </a:lnRef>
-          <a:fillRef idx="1">
-            <a:schemeClr val="accent1"/>
-          </a:fillRef>
-          <a:effectRef idx="0">
-            <a:schemeClr val="accent1"/>
-          </a:effectRef>
-          <a:fontRef idx="minor">
-            <a:schemeClr val="lt1"/>
-          </a:fontRef>
-        </p:style>
-        <p:txBody>
-          <a:bodyPr rtlCol="0" anchor="ctr"/>
-          <a:lstStyle/>
-          <a:p>
-            <a:pPr algn="ctr"/>
-            <a:r>
-              <a:rPr lang="en-US" sz="2000" dirty="0">
-                <a:solidFill>
-                  <a:schemeClr val="tx1"/>
-                </a:solidFill>
-              </a:rPr>
-              <a:t>Task 6</a:t>
-            </a:r>
-          </a:p>
-        </p:txBody>
-      </p:sp>
-      <p:sp>
-        <p:nvSpPr>
-          <p:cNvPr id="15" name="Rectangle 14">
-            <a:extLst>
-              <a:ext uri="{FF2B5EF4-FFF2-40B4-BE49-F238E27FC236}">
-                <a16:creationId xmlns:a16="http://schemas.microsoft.com/office/drawing/2014/main" id="{61068EE1-BB58-AE4F-8971-70CDB1176ED7}"/>
-              </a:ext>
-            </a:extLst>
-          </p:cNvPr>
-          <p:cNvSpPr/>
-          <p:nvPr/>
-        </p:nvSpPr>
-        <p:spPr>
-          <a:xfrm>
-            <a:off x="7287809" y="2432421"/>
-            <a:ext cx="973903" cy="431515"/>
-          </a:xfrm>
-          <a:prstGeom prst="rect">
-            <a:avLst/>
-          </a:prstGeom>
-          <a:solidFill>
-            <a:schemeClr val="bg1">
-              <a:lumMod val="75000"/>
-            </a:schemeClr>
-          </a:solidFill>
-          <a:ln w="19050">
-            <a:solidFill>
-              <a:schemeClr val="tx1"/>
-            </a:solidFill>
-          </a:ln>
-        </p:spPr>
-        <p:style>
-          <a:lnRef idx="2">
-            <a:schemeClr val="accent1">
-              <a:shade val="50000"/>
-            </a:schemeClr>
-          </a:lnRef>
-          <a:fillRef idx="1">
-            <a:schemeClr val="accent1"/>
-          </a:fillRef>
-          <a:effectRef idx="0">
-            <a:schemeClr val="accent1"/>
-          </a:effectRef>
-          <a:fontRef idx="minor">
-            <a:schemeClr val="lt1"/>
-          </a:fontRef>
-        </p:style>
-        <p:txBody>
-          <a:bodyPr rtlCol="0" anchor="ctr"/>
-          <a:lstStyle/>
-          <a:p>
-            <a:pPr algn="ctr"/>
-            <a:r>
-              <a:rPr lang="en-US" sz="2000" dirty="0">
-                <a:solidFill>
-                  <a:schemeClr val="tx1"/>
-                </a:solidFill>
-              </a:rPr>
-              <a:t>Task 7</a:t>
-            </a:r>
-          </a:p>
-        </p:txBody>
-      </p:sp>
-      <p:sp>
-        <p:nvSpPr>
-          <p:cNvPr id="16" name="Rectangle 15">
-            <a:extLst>
-              <a:ext uri="{FF2B5EF4-FFF2-40B4-BE49-F238E27FC236}">
-                <a16:creationId xmlns:a16="http://schemas.microsoft.com/office/drawing/2014/main" id="{A130D459-6F29-BF4D-B867-CBE706EE62E6}"/>
-              </a:ext>
-            </a:extLst>
-          </p:cNvPr>
-          <p:cNvSpPr/>
-          <p:nvPr/>
-        </p:nvSpPr>
-        <p:spPr>
-          <a:xfrm>
-            <a:off x="8428027" y="2432421"/>
-            <a:ext cx="973903" cy="431515"/>
-          </a:xfrm>
-          <a:prstGeom prst="rect">
-            <a:avLst/>
-          </a:prstGeom>
-          <a:solidFill>
-            <a:schemeClr val="bg1">
-              <a:lumMod val="50000"/>
-            </a:schemeClr>
-          </a:solidFill>
-          <a:ln w="19050">
-            <a:solidFill>
-              <a:schemeClr val="tx1"/>
-            </a:solidFill>
-          </a:ln>
-        </p:spPr>
-        <p:style>
-          <a:lnRef idx="2">
-            <a:schemeClr val="accent1">
-              <a:shade val="50000"/>
-            </a:schemeClr>
-          </a:lnRef>
-          <a:fillRef idx="1">
-            <a:schemeClr val="accent1"/>
-          </a:fillRef>
-          <a:effectRef idx="0">
-            <a:schemeClr val="accent1"/>
-          </a:effectRef>
-          <a:fontRef idx="minor">
-            <a:schemeClr val="lt1"/>
-          </a:fontRef>
-        </p:style>
-        <p:txBody>
-          <a:bodyPr rtlCol="0" anchor="ctr"/>
-          <a:lstStyle/>
-          <a:p>
-            <a:pPr algn="ctr"/>
-            <a:r>
-              <a:rPr lang="en-US" sz="2000" dirty="0">
-                <a:solidFill>
-                  <a:schemeClr val="tx1"/>
-                </a:solidFill>
-              </a:rPr>
-              <a:t>Task 8</a:t>
-            </a:r>
-          </a:p>
-        </p:txBody>
-      </p:sp>
-      <p:sp>
-        <p:nvSpPr>
-          <p:cNvPr id="17" name="Rectangle 16">
-            <a:extLst>
-              <a:ext uri="{FF2B5EF4-FFF2-40B4-BE49-F238E27FC236}">
-                <a16:creationId xmlns:a16="http://schemas.microsoft.com/office/drawing/2014/main" id="{E295A9D2-968F-654D-AEA8-42E8A3BB9426}"/>
-              </a:ext>
-            </a:extLst>
-          </p:cNvPr>
-          <p:cNvSpPr/>
-          <p:nvPr/>
-        </p:nvSpPr>
-        <p:spPr>
-          <a:xfrm>
-            <a:off x="9664131" y="2432421"/>
-            <a:ext cx="973903" cy="431515"/>
-          </a:xfrm>
-          <a:prstGeom prst="rect">
-            <a:avLst/>
-          </a:prstGeom>
-          <a:solidFill>
-            <a:schemeClr val="bg1">
-              <a:lumMod val="95000"/>
-            </a:schemeClr>
-          </a:solidFill>
-          <a:ln w="19050">
-            <a:solidFill>
-              <a:schemeClr val="tx1"/>
-            </a:solidFill>
-          </a:ln>
-        </p:spPr>
-        <p:style>
-          <a:lnRef idx="2">
-            <a:schemeClr val="accent1">
-              <a:shade val="50000"/>
-            </a:schemeClr>
-          </a:lnRef>
-          <a:fillRef idx="1">
-            <a:schemeClr val="accent1"/>
-          </a:fillRef>
-          <a:effectRef idx="0">
-            <a:schemeClr val="accent1"/>
-          </a:effectRef>
-          <a:fontRef idx="minor">
-            <a:schemeClr val="lt1"/>
-          </a:fontRef>
-        </p:style>
-        <p:txBody>
-          <a:bodyPr rtlCol="0" anchor="ctr"/>
-          <a:lstStyle/>
-          <a:p>
-            <a:pPr algn="ctr"/>
-            <a:r>
-              <a:rPr lang="en-US" sz="2000" dirty="0">
-                <a:solidFill>
-                  <a:schemeClr val="tx1"/>
-                </a:solidFill>
-              </a:rPr>
-              <a:t>Task 9</a:t>
-            </a:r>
-          </a:p>
-        </p:txBody>
-      </p:sp>
-      <p:sp>
-        <p:nvSpPr>
-          <p:cNvPr id="18" name="Rectangle 17">
-            <a:extLst>
-              <a:ext uri="{FF2B5EF4-FFF2-40B4-BE49-F238E27FC236}">
-                <a16:creationId xmlns:a16="http://schemas.microsoft.com/office/drawing/2014/main" id="{4D0A8985-B2AE-EA4F-A734-5523D9FF55BA}"/>
-              </a:ext>
-            </a:extLst>
-          </p:cNvPr>
-          <p:cNvSpPr/>
-          <p:nvPr/>
-        </p:nvSpPr>
-        <p:spPr>
-          <a:xfrm>
-            <a:off x="10773527" y="2432421"/>
-            <a:ext cx="1028486" cy="431515"/>
-          </a:xfrm>
-          <a:prstGeom prst="rect">
-            <a:avLst/>
-          </a:prstGeom>
-          <a:solidFill>
-            <a:schemeClr val="bg1">
-              <a:lumMod val="85000"/>
-            </a:schemeClr>
-          </a:solidFill>
-          <a:ln w="19050">
-            <a:solidFill>
-              <a:schemeClr val="tx1"/>
-            </a:solidFill>
-          </a:ln>
-        </p:spPr>
-        <p:style>
-          <a:lnRef idx="2">
-            <a:schemeClr val="accent1">
-              <a:shade val="50000"/>
-            </a:schemeClr>
-          </a:lnRef>
-          <a:fillRef idx="1">
-            <a:schemeClr val="accent1"/>
-          </a:fillRef>
-          <a:effectRef idx="0">
-            <a:schemeClr val="accent1"/>
-          </a:effectRef>
-          <a:fontRef idx="minor">
-            <a:schemeClr val="lt1"/>
-          </a:fontRef>
-        </p:style>
-        <p:txBody>
-          <a:bodyPr rtlCol="0" anchor="ctr"/>
-          <a:lstStyle/>
-          <a:p>
-            <a:pPr algn="ctr"/>
-            <a:r>
-              <a:rPr lang="en-US" sz="2000" dirty="0">
-                <a:solidFill>
-                  <a:schemeClr val="tx1"/>
-                </a:solidFill>
-              </a:rPr>
-              <a:t>Task10 </a:t>
-            </a:r>
-          </a:p>
-        </p:txBody>
-      </p:sp>
-      <p:sp>
-        <p:nvSpPr>
-          <p:cNvPr id="21" name="Rectangle 20">
-            <a:extLst>
-              <a:ext uri="{FF2B5EF4-FFF2-40B4-BE49-F238E27FC236}">
-                <a16:creationId xmlns:a16="http://schemas.microsoft.com/office/drawing/2014/main" id="{23B81FF6-FB32-564C-A443-EE8280F6551C}"/>
-              </a:ext>
-            </a:extLst>
-          </p:cNvPr>
-          <p:cNvSpPr/>
-          <p:nvPr/>
-        </p:nvSpPr>
-        <p:spPr>
-          <a:xfrm>
-            <a:off x="1901146" y="3749231"/>
-            <a:ext cx="1302037" cy="431515"/>
-          </a:xfrm>
-          <a:prstGeom prst="rect">
-            <a:avLst/>
-          </a:prstGeom>
-          <a:solidFill>
-            <a:schemeClr val="bg1">
-              <a:lumMod val="75000"/>
-            </a:schemeClr>
-          </a:solidFill>
-          <a:ln w="19050">
-            <a:solidFill>
-              <a:schemeClr val="tx1"/>
-            </a:solidFill>
-          </a:ln>
-        </p:spPr>
-        <p:style>
-          <a:lnRef idx="2">
-            <a:schemeClr val="accent1">
-              <a:shade val="50000"/>
-            </a:schemeClr>
-          </a:lnRef>
-          <a:fillRef idx="1">
-            <a:schemeClr val="accent1"/>
-          </a:fillRef>
-          <a:effectRef idx="0">
-            <a:schemeClr val="accent1"/>
-          </a:effectRef>
-          <a:fontRef idx="minor">
-            <a:schemeClr val="lt1"/>
-          </a:fontRef>
-        </p:style>
-        <p:txBody>
-          <a:bodyPr rtlCol="0" anchor="ctr"/>
-          <a:lstStyle/>
-          <a:p>
-            <a:pPr algn="ctr"/>
-            <a:r>
-              <a:rPr lang="en-US" sz="2000" dirty="0">
-                <a:solidFill>
-                  <a:schemeClr val="tx1"/>
-                </a:solidFill>
-              </a:rPr>
-              <a:t>Task 2</a:t>
-            </a:r>
-          </a:p>
-        </p:txBody>
-      </p:sp>
-      <p:sp>
-        <p:nvSpPr>
-          <p:cNvPr id="22" name="Rectangle 21">
-            <a:extLst>
-              <a:ext uri="{FF2B5EF4-FFF2-40B4-BE49-F238E27FC236}">
-                <a16:creationId xmlns:a16="http://schemas.microsoft.com/office/drawing/2014/main" id="{496C9E59-CE12-154D-B644-73329B1AF548}"/>
-              </a:ext>
-            </a:extLst>
-          </p:cNvPr>
-          <p:cNvSpPr/>
-          <p:nvPr/>
-        </p:nvSpPr>
-        <p:spPr>
-          <a:xfrm>
-            <a:off x="3357722" y="3749231"/>
-            <a:ext cx="1302037" cy="431515"/>
-          </a:xfrm>
-          <a:prstGeom prst="rect">
-            <a:avLst/>
-          </a:prstGeom>
-          <a:solidFill>
-            <a:schemeClr val="bg1">
-              <a:lumMod val="50000"/>
-            </a:schemeClr>
-          </a:solidFill>
-          <a:ln w="19050">
-            <a:solidFill>
-              <a:schemeClr val="tx1"/>
-            </a:solidFill>
-          </a:ln>
-        </p:spPr>
-        <p:style>
-          <a:lnRef idx="2">
-            <a:schemeClr val="accent1">
-              <a:shade val="50000"/>
-            </a:schemeClr>
-          </a:lnRef>
-          <a:fillRef idx="1">
-            <a:schemeClr val="accent1"/>
-          </a:fillRef>
-          <a:effectRef idx="0">
-            <a:schemeClr val="accent1"/>
-          </a:effectRef>
-          <a:fontRef idx="minor">
-            <a:schemeClr val="lt1"/>
-          </a:fontRef>
-        </p:style>
-        <p:txBody>
-          <a:bodyPr rtlCol="0" anchor="ctr"/>
-          <a:lstStyle/>
-          <a:p>
-            <a:pPr algn="ctr"/>
-            <a:r>
-              <a:rPr lang="en-US" sz="2000" dirty="0">
-                <a:solidFill>
-                  <a:schemeClr val="tx1"/>
-                </a:solidFill>
-              </a:rPr>
-              <a:t>Task 3</a:t>
-            </a:r>
-          </a:p>
-        </p:txBody>
-      </p:sp>
-      <p:sp>
-        <p:nvSpPr>
-          <p:cNvPr id="24" name="Rectangle 23">
-            <a:extLst>
-              <a:ext uri="{FF2B5EF4-FFF2-40B4-BE49-F238E27FC236}">
-                <a16:creationId xmlns:a16="http://schemas.microsoft.com/office/drawing/2014/main" id="{C9857138-58C5-574B-8061-77344AA8BDA6}"/>
-              </a:ext>
-            </a:extLst>
-          </p:cNvPr>
-          <p:cNvSpPr/>
-          <p:nvPr/>
-        </p:nvSpPr>
-        <p:spPr>
-          <a:xfrm>
-            <a:off x="4814298" y="3749231"/>
-            <a:ext cx="1302037" cy="431515"/>
-          </a:xfrm>
-          <a:prstGeom prst="rect">
-            <a:avLst/>
-          </a:prstGeom>
-          <a:solidFill>
-            <a:schemeClr val="bg1">
-              <a:lumMod val="75000"/>
-            </a:schemeClr>
-          </a:solidFill>
-          <a:ln w="19050">
-            <a:solidFill>
-              <a:schemeClr val="tx1"/>
-            </a:solidFill>
-          </a:ln>
-        </p:spPr>
-        <p:style>
-          <a:lnRef idx="2">
-            <a:schemeClr val="accent1">
-              <a:shade val="50000"/>
-            </a:schemeClr>
-          </a:lnRef>
-          <a:fillRef idx="1">
-            <a:schemeClr val="accent1"/>
-          </a:fillRef>
-          <a:effectRef idx="0">
-            <a:schemeClr val="accent1"/>
-          </a:effectRef>
-          <a:fontRef idx="minor">
-            <a:schemeClr val="lt1"/>
-          </a:fontRef>
-        </p:style>
-        <p:txBody>
-          <a:bodyPr rtlCol="0" anchor="ctr"/>
-          <a:lstStyle/>
-          <a:p>
-            <a:pPr algn="ctr"/>
-            <a:r>
-              <a:rPr lang="en-US" sz="2000" dirty="0">
-                <a:solidFill>
-                  <a:schemeClr val="tx1"/>
-                </a:solidFill>
-              </a:rPr>
-              <a:t>Task 4</a:t>
-            </a:r>
-          </a:p>
-        </p:txBody>
-      </p:sp>
-      <p:sp>
-        <p:nvSpPr>
-          <p:cNvPr id="25" name="Rectangle 24">
-            <a:extLst>
-              <a:ext uri="{FF2B5EF4-FFF2-40B4-BE49-F238E27FC236}">
-                <a16:creationId xmlns:a16="http://schemas.microsoft.com/office/drawing/2014/main" id="{AE875E4E-18A9-8646-85AA-EB7C3B7B565C}"/>
-              </a:ext>
-            </a:extLst>
-          </p:cNvPr>
-          <p:cNvSpPr/>
-          <p:nvPr/>
-        </p:nvSpPr>
-        <p:spPr>
-          <a:xfrm>
-            <a:off x="6270874" y="3749231"/>
-            <a:ext cx="1302037" cy="431515"/>
-          </a:xfrm>
-          <a:prstGeom prst="rect">
-            <a:avLst/>
-          </a:prstGeom>
-          <a:solidFill>
-            <a:schemeClr val="bg1">
-              <a:lumMod val="85000"/>
-            </a:schemeClr>
-          </a:solidFill>
-          <a:ln w="19050">
-            <a:solidFill>
-              <a:schemeClr val="tx1"/>
-            </a:solidFill>
-          </a:ln>
-        </p:spPr>
-        <p:style>
-          <a:lnRef idx="2">
-            <a:schemeClr val="accent1">
-              <a:shade val="50000"/>
-            </a:schemeClr>
-          </a:lnRef>
-          <a:fillRef idx="1">
-            <a:schemeClr val="accent1"/>
-          </a:fillRef>
-          <a:effectRef idx="0">
-            <a:schemeClr val="accent1"/>
-          </a:effectRef>
-          <a:fontRef idx="minor">
-            <a:schemeClr val="lt1"/>
-          </a:fontRef>
-        </p:style>
-        <p:txBody>
-          <a:bodyPr rtlCol="0" anchor="ctr"/>
-          <a:lstStyle/>
-          <a:p>
-            <a:pPr algn="ctr"/>
-            <a:r>
-              <a:rPr lang="en-US" sz="2000" dirty="0">
-                <a:solidFill>
-                  <a:schemeClr val="tx1"/>
-                </a:solidFill>
-              </a:rPr>
-              <a:t>Task 5</a:t>
-            </a:r>
-          </a:p>
-        </p:txBody>
-      </p:sp>
-      <p:sp>
-        <p:nvSpPr>
-          <p:cNvPr id="26" name="Rectangle 25">
-            <a:extLst>
-              <a:ext uri="{FF2B5EF4-FFF2-40B4-BE49-F238E27FC236}">
-                <a16:creationId xmlns:a16="http://schemas.microsoft.com/office/drawing/2014/main" id="{4F337E31-B681-BC43-AD6F-7E934AA93B4C}"/>
-              </a:ext>
-            </a:extLst>
-          </p:cNvPr>
-          <p:cNvSpPr/>
-          <p:nvPr/>
-        </p:nvSpPr>
-        <p:spPr>
-          <a:xfrm>
-            <a:off x="7697060" y="3749231"/>
-            <a:ext cx="1302037" cy="431515"/>
-          </a:xfrm>
-          <a:prstGeom prst="rect">
-            <a:avLst/>
-          </a:prstGeom>
-          <a:solidFill>
-            <a:schemeClr val="bg1">
-              <a:lumMod val="50000"/>
-            </a:schemeClr>
-          </a:solidFill>
-          <a:ln w="19050">
-            <a:solidFill>
-              <a:schemeClr val="tx1"/>
-            </a:solidFill>
-          </a:ln>
-        </p:spPr>
-        <p:style>
-          <a:lnRef idx="2">
-            <a:schemeClr val="accent1">
-              <a:shade val="50000"/>
-            </a:schemeClr>
-          </a:lnRef>
-          <a:fillRef idx="1">
-            <a:schemeClr val="accent1"/>
-          </a:fillRef>
-          <a:effectRef idx="0">
-            <a:schemeClr val="accent1"/>
-          </a:effectRef>
-          <a:fontRef idx="minor">
-            <a:schemeClr val="lt1"/>
-          </a:fontRef>
-        </p:style>
-        <p:txBody>
-          <a:bodyPr rtlCol="0" anchor="ctr"/>
-          <a:lstStyle/>
-          <a:p>
-            <a:pPr algn="ctr"/>
-            <a:r>
-              <a:rPr lang="en-US" sz="2000" dirty="0">
-                <a:solidFill>
-                  <a:schemeClr val="tx1"/>
-                </a:solidFill>
-              </a:rPr>
-              <a:t>Task 6</a:t>
-            </a:r>
-          </a:p>
-        </p:txBody>
-      </p:sp>
-      <p:sp>
-        <p:nvSpPr>
-          <p:cNvPr id="27" name="Rectangle 26">
-            <a:extLst>
-              <a:ext uri="{FF2B5EF4-FFF2-40B4-BE49-F238E27FC236}">
-                <a16:creationId xmlns:a16="http://schemas.microsoft.com/office/drawing/2014/main" id="{F318D34B-40DA-0F4F-A298-387F87E4E2F3}"/>
-              </a:ext>
-            </a:extLst>
-          </p:cNvPr>
-          <p:cNvSpPr/>
-          <p:nvPr/>
-        </p:nvSpPr>
-        <p:spPr>
-          <a:xfrm>
-            <a:off x="9112108" y="3749231"/>
-            <a:ext cx="1302037" cy="431515"/>
-          </a:xfrm>
-          <a:prstGeom prst="rect">
-            <a:avLst/>
-          </a:prstGeom>
-          <a:solidFill>
-            <a:schemeClr val="bg1">
-              <a:lumMod val="95000"/>
-            </a:schemeClr>
-          </a:solidFill>
-          <a:ln w="19050">
-            <a:solidFill>
-              <a:schemeClr val="tx1"/>
-            </a:solidFill>
-          </a:ln>
-        </p:spPr>
-        <p:style>
-          <a:lnRef idx="2">
-            <a:schemeClr val="accent1">
-              <a:shade val="50000"/>
-            </a:schemeClr>
-          </a:lnRef>
-          <a:fillRef idx="1">
-            <a:schemeClr val="accent1"/>
-          </a:fillRef>
-          <a:effectRef idx="0">
-            <a:schemeClr val="accent1"/>
-          </a:effectRef>
-          <a:fontRef idx="minor">
-            <a:schemeClr val="lt1"/>
-          </a:fontRef>
-        </p:style>
-        <p:txBody>
-          <a:bodyPr rtlCol="0" anchor="ctr"/>
-          <a:lstStyle/>
-          <a:p>
-            <a:pPr algn="ctr"/>
-            <a:r>
-              <a:rPr lang="en-US" sz="2000" dirty="0">
-                <a:solidFill>
-                  <a:schemeClr val="tx1"/>
-                </a:solidFill>
-              </a:rPr>
-              <a:t>Task 7</a:t>
-            </a:r>
-          </a:p>
-        </p:txBody>
-      </p:sp>
-      <p:sp>
-        <p:nvSpPr>
-          <p:cNvPr id="29" name="Rectangle 28">
-            <a:extLst>
-              <a:ext uri="{FF2B5EF4-FFF2-40B4-BE49-F238E27FC236}">
-                <a16:creationId xmlns:a16="http://schemas.microsoft.com/office/drawing/2014/main" id="{FF939F75-1CD5-5E42-8F16-BC937A3F9869}"/>
-              </a:ext>
-            </a:extLst>
-          </p:cNvPr>
-          <p:cNvSpPr/>
-          <p:nvPr/>
-        </p:nvSpPr>
-        <p:spPr>
-          <a:xfrm>
-            <a:off x="10499976" y="3749231"/>
-            <a:ext cx="1302037" cy="431515"/>
-          </a:xfrm>
-          <a:prstGeom prst="rect">
-            <a:avLst/>
-          </a:prstGeom>
-          <a:solidFill>
-            <a:schemeClr val="bg1">
-              <a:lumMod val="75000"/>
-            </a:schemeClr>
-          </a:solidFill>
-          <a:ln w="19050">
-            <a:solidFill>
-              <a:schemeClr val="tx1"/>
-            </a:solidFill>
-          </a:ln>
-        </p:spPr>
-        <p:style>
-          <a:lnRef idx="2">
-            <a:schemeClr val="accent1">
-              <a:shade val="50000"/>
-            </a:schemeClr>
-          </a:lnRef>
-          <a:fillRef idx="1">
-            <a:schemeClr val="accent1"/>
-          </a:fillRef>
-          <a:effectRef idx="0">
-            <a:schemeClr val="accent1"/>
-          </a:effectRef>
-          <a:fontRef idx="minor">
-            <a:schemeClr val="lt1"/>
-          </a:fontRef>
-        </p:style>
-        <p:txBody>
-          <a:bodyPr rtlCol="0" anchor="ctr"/>
-          <a:lstStyle/>
-          <a:p>
-            <a:pPr algn="ctr"/>
-            <a:r>
-              <a:rPr lang="en-US" sz="2000" dirty="0">
-                <a:solidFill>
-                  <a:schemeClr val="tx1"/>
-                </a:solidFill>
-              </a:rPr>
-              <a:t>Task 8 </a:t>
-            </a:r>
-          </a:p>
-        </p:txBody>
-      </p:sp>
-      <p:sp>
-        <p:nvSpPr>
-          <p:cNvPr id="30" name="Rectangle 29">
-            <a:extLst>
-              <a:ext uri="{FF2B5EF4-FFF2-40B4-BE49-F238E27FC236}">
-                <a16:creationId xmlns:a16="http://schemas.microsoft.com/office/drawing/2014/main" id="{FF1D1245-F9B2-7845-BE62-8181C94FE1B0}"/>
-              </a:ext>
-            </a:extLst>
-          </p:cNvPr>
-          <p:cNvSpPr/>
-          <p:nvPr/>
-        </p:nvSpPr>
-        <p:spPr>
-          <a:xfrm>
-            <a:off x="444570" y="5123414"/>
-            <a:ext cx="1702729" cy="431515"/>
-          </a:xfrm>
-          <a:prstGeom prst="rect">
-            <a:avLst/>
-          </a:prstGeom>
-          <a:solidFill>
-            <a:schemeClr val="bg1">
-              <a:lumMod val="95000"/>
-            </a:schemeClr>
-          </a:solidFill>
-          <a:ln w="19050">
-            <a:solidFill>
-              <a:schemeClr val="tx1"/>
-            </a:solidFill>
-          </a:ln>
-        </p:spPr>
-        <p:style>
-          <a:lnRef idx="2">
-            <a:schemeClr val="accent1">
-              <a:shade val="50000"/>
-            </a:schemeClr>
-          </a:lnRef>
-          <a:fillRef idx="1">
-            <a:schemeClr val="accent1"/>
-          </a:fillRef>
-          <a:effectRef idx="0">
-            <a:schemeClr val="accent1"/>
-          </a:effectRef>
-          <a:fontRef idx="minor">
-            <a:schemeClr val="lt1"/>
-          </a:fontRef>
-        </p:style>
-        <p:txBody>
-          <a:bodyPr rtlCol="0" anchor="ctr"/>
-          <a:lstStyle/>
-          <a:p>
-            <a:pPr algn="ctr"/>
-            <a:r>
-              <a:rPr lang="en-US" sz="2000" dirty="0">
-                <a:solidFill>
-                  <a:schemeClr val="tx1"/>
-                </a:solidFill>
-              </a:rPr>
-              <a:t>Task 1</a:t>
-            </a:r>
-          </a:p>
-        </p:txBody>
-      </p:sp>
-      <p:sp>
-        <p:nvSpPr>
-          <p:cNvPr id="31" name="Rectangle 30">
-            <a:extLst>
-              <a:ext uri="{FF2B5EF4-FFF2-40B4-BE49-F238E27FC236}">
-                <a16:creationId xmlns:a16="http://schemas.microsoft.com/office/drawing/2014/main" id="{3596D639-70C5-9240-8C46-196B529A41B8}"/>
-              </a:ext>
-            </a:extLst>
-          </p:cNvPr>
-          <p:cNvSpPr/>
-          <p:nvPr/>
-        </p:nvSpPr>
-        <p:spPr>
-          <a:xfrm>
-            <a:off x="2289857" y="5123414"/>
-            <a:ext cx="1702729" cy="431515"/>
-          </a:xfrm>
-          <a:prstGeom prst="rect">
-            <a:avLst/>
-          </a:prstGeom>
-          <a:solidFill>
-            <a:schemeClr val="bg1">
-              <a:lumMod val="85000"/>
-            </a:schemeClr>
-          </a:solidFill>
-          <a:ln w="19050">
-            <a:solidFill>
-              <a:schemeClr val="tx1"/>
-            </a:solidFill>
-          </a:ln>
-        </p:spPr>
-        <p:style>
-          <a:lnRef idx="2">
-            <a:schemeClr val="accent1">
-              <a:shade val="50000"/>
-            </a:schemeClr>
-          </a:lnRef>
-          <a:fillRef idx="1">
-            <a:schemeClr val="accent1"/>
-          </a:fillRef>
-          <a:effectRef idx="0">
-            <a:schemeClr val="accent1"/>
-          </a:effectRef>
-          <a:fontRef idx="minor">
-            <a:schemeClr val="lt1"/>
-          </a:fontRef>
-        </p:style>
-        <p:txBody>
-          <a:bodyPr rtlCol="0" anchor="ctr"/>
-          <a:lstStyle/>
-          <a:p>
-            <a:pPr algn="ctr"/>
-            <a:r>
-              <a:rPr lang="en-US" sz="2000" dirty="0">
-                <a:solidFill>
-                  <a:schemeClr val="tx1"/>
-                </a:solidFill>
-              </a:rPr>
-              <a:t>Task 2</a:t>
-            </a:r>
-          </a:p>
-        </p:txBody>
-      </p:sp>
-      <p:sp>
-        <p:nvSpPr>
-          <p:cNvPr id="32" name="Rectangle 31">
-            <a:extLst>
-              <a:ext uri="{FF2B5EF4-FFF2-40B4-BE49-F238E27FC236}">
-                <a16:creationId xmlns:a16="http://schemas.microsoft.com/office/drawing/2014/main" id="{8984BD35-E475-9A48-B68C-D94E9ECDA7D4}"/>
-              </a:ext>
-            </a:extLst>
-          </p:cNvPr>
-          <p:cNvSpPr/>
-          <p:nvPr/>
-        </p:nvSpPr>
-        <p:spPr>
-          <a:xfrm>
-            <a:off x="4140703" y="5123414"/>
-            <a:ext cx="1702729" cy="431515"/>
-          </a:xfrm>
-          <a:prstGeom prst="rect">
-            <a:avLst/>
-          </a:prstGeom>
-          <a:solidFill>
-            <a:schemeClr val="bg1">
-              <a:lumMod val="75000"/>
-            </a:schemeClr>
-          </a:solidFill>
-          <a:ln w="19050">
-            <a:solidFill>
-              <a:schemeClr val="tx1"/>
-            </a:solidFill>
-          </a:ln>
-        </p:spPr>
-        <p:style>
-          <a:lnRef idx="2">
-            <a:schemeClr val="accent1">
-              <a:shade val="50000"/>
-            </a:schemeClr>
-          </a:lnRef>
-          <a:fillRef idx="1">
-            <a:schemeClr val="accent1"/>
-          </a:fillRef>
-          <a:effectRef idx="0">
-            <a:schemeClr val="accent1"/>
-          </a:effectRef>
-          <a:fontRef idx="minor">
-            <a:schemeClr val="lt1"/>
-          </a:fontRef>
-        </p:style>
-        <p:txBody>
-          <a:bodyPr rtlCol="0" anchor="ctr"/>
-          <a:lstStyle/>
-          <a:p>
-            <a:pPr algn="ctr"/>
-            <a:r>
-              <a:rPr lang="en-US" sz="2000" dirty="0">
-                <a:solidFill>
-                  <a:schemeClr val="tx1"/>
-                </a:solidFill>
-              </a:rPr>
-              <a:t>Task 3</a:t>
-            </a:r>
-          </a:p>
-        </p:txBody>
-      </p:sp>
-      <p:sp>
-        <p:nvSpPr>
-          <p:cNvPr id="33" name="Rectangle 32">
-            <a:extLst>
-              <a:ext uri="{FF2B5EF4-FFF2-40B4-BE49-F238E27FC236}">
-                <a16:creationId xmlns:a16="http://schemas.microsoft.com/office/drawing/2014/main" id="{6414211E-54BC-C549-932C-10A1DE996EE8}"/>
-              </a:ext>
-            </a:extLst>
-          </p:cNvPr>
-          <p:cNvSpPr/>
-          <p:nvPr/>
-        </p:nvSpPr>
-        <p:spPr>
-          <a:xfrm>
-            <a:off x="5985990" y="5123414"/>
-            <a:ext cx="1702729" cy="431515"/>
-          </a:xfrm>
-          <a:prstGeom prst="rect">
-            <a:avLst/>
-          </a:prstGeom>
-          <a:solidFill>
-            <a:schemeClr val="bg1">
-              <a:lumMod val="50000"/>
-            </a:schemeClr>
-          </a:solidFill>
-          <a:ln w="19050">
-            <a:solidFill>
-              <a:schemeClr val="tx1"/>
-            </a:solidFill>
-          </a:ln>
-        </p:spPr>
-        <p:style>
-          <a:lnRef idx="2">
-            <a:schemeClr val="accent1">
-              <a:shade val="50000"/>
-            </a:schemeClr>
-          </a:lnRef>
-          <a:fillRef idx="1">
-            <a:schemeClr val="accent1"/>
-          </a:fillRef>
-          <a:effectRef idx="0">
-            <a:schemeClr val="accent1"/>
-          </a:effectRef>
-          <a:fontRef idx="minor">
-            <a:schemeClr val="lt1"/>
-          </a:fontRef>
-        </p:style>
-        <p:txBody>
-          <a:bodyPr rtlCol="0" anchor="ctr"/>
-          <a:lstStyle/>
-          <a:p>
-            <a:pPr algn="ctr"/>
-            <a:r>
-              <a:rPr lang="en-US" sz="2000" dirty="0">
-                <a:solidFill>
-                  <a:schemeClr val="tx1"/>
-                </a:solidFill>
-              </a:rPr>
-              <a:t>Task 4</a:t>
-            </a:r>
-          </a:p>
-        </p:txBody>
-      </p:sp>
-      <p:sp>
-        <p:nvSpPr>
-          <p:cNvPr id="34" name="Rectangle 33">
-            <a:extLst>
-              <a:ext uri="{FF2B5EF4-FFF2-40B4-BE49-F238E27FC236}">
-                <a16:creationId xmlns:a16="http://schemas.microsoft.com/office/drawing/2014/main" id="{074B3009-B4C5-1442-87A4-0B0AA494D00C}"/>
-              </a:ext>
-            </a:extLst>
-          </p:cNvPr>
-          <p:cNvSpPr/>
-          <p:nvPr/>
-        </p:nvSpPr>
-        <p:spPr>
-          <a:xfrm>
-            <a:off x="7821099" y="5123414"/>
-            <a:ext cx="881226" cy="431515"/>
-          </a:xfrm>
-          <a:prstGeom prst="rect">
-            <a:avLst/>
-          </a:prstGeom>
-          <a:solidFill>
-            <a:schemeClr val="bg1">
-              <a:lumMod val="95000"/>
-            </a:schemeClr>
-          </a:solidFill>
-          <a:ln w="19050">
-            <a:solidFill>
-              <a:schemeClr val="tx1"/>
-            </a:solidFill>
-          </a:ln>
-        </p:spPr>
-        <p:style>
-          <a:lnRef idx="2">
-            <a:schemeClr val="accent1">
-              <a:shade val="50000"/>
-            </a:schemeClr>
-          </a:lnRef>
-          <a:fillRef idx="1">
-            <a:schemeClr val="accent1"/>
-          </a:fillRef>
-          <a:effectRef idx="0">
-            <a:schemeClr val="accent1"/>
-          </a:effectRef>
-          <a:fontRef idx="minor">
-            <a:schemeClr val="lt1"/>
-          </a:fontRef>
-        </p:style>
-        <p:txBody>
-          <a:bodyPr rtlCol="0" anchor="ctr"/>
-          <a:lstStyle/>
-          <a:p>
-            <a:pPr algn="ctr"/>
-            <a:r>
-              <a:rPr lang="en-US" sz="2000" dirty="0">
-                <a:solidFill>
-                  <a:schemeClr val="tx1"/>
-                </a:solidFill>
-              </a:rPr>
-              <a:t>Task 5</a:t>
-            </a:r>
-          </a:p>
-        </p:txBody>
-      </p:sp>
-      <p:sp>
-        <p:nvSpPr>
-          <p:cNvPr id="35" name="Rectangle 34">
-            <a:extLst>
-              <a:ext uri="{FF2B5EF4-FFF2-40B4-BE49-F238E27FC236}">
-                <a16:creationId xmlns:a16="http://schemas.microsoft.com/office/drawing/2014/main" id="{A23370AF-C825-2C42-AC12-7612DC3505A8}"/>
-              </a:ext>
-            </a:extLst>
-          </p:cNvPr>
-          <p:cNvSpPr/>
-          <p:nvPr/>
-        </p:nvSpPr>
-        <p:spPr>
-          <a:xfrm>
-            <a:off x="8847987" y="5123414"/>
-            <a:ext cx="881226" cy="431515"/>
-          </a:xfrm>
-          <a:prstGeom prst="rect">
-            <a:avLst/>
-          </a:prstGeom>
-          <a:solidFill>
-            <a:schemeClr val="bg1">
-              <a:lumMod val="85000"/>
-            </a:schemeClr>
-          </a:solidFill>
-          <a:ln w="19050">
-            <a:solidFill>
-              <a:schemeClr val="tx1"/>
-            </a:solidFill>
-          </a:ln>
-        </p:spPr>
-        <p:style>
-          <a:lnRef idx="2">
-            <a:schemeClr val="accent1">
-              <a:shade val="50000"/>
-            </a:schemeClr>
-          </a:lnRef>
-          <a:fillRef idx="1">
-            <a:schemeClr val="accent1"/>
-          </a:fillRef>
-          <a:effectRef idx="0">
-            <a:schemeClr val="accent1"/>
-          </a:effectRef>
-          <a:fontRef idx="minor">
-            <a:schemeClr val="lt1"/>
-          </a:fontRef>
-        </p:style>
-        <p:txBody>
-          <a:bodyPr rtlCol="0" anchor="ctr"/>
-          <a:lstStyle/>
-          <a:p>
-            <a:pPr algn="ctr"/>
-            <a:r>
-              <a:rPr lang="en-US" sz="2000" dirty="0">
-                <a:solidFill>
-                  <a:schemeClr val="tx1"/>
-                </a:solidFill>
-              </a:rPr>
-              <a:t>Task 6</a:t>
-            </a:r>
-          </a:p>
-        </p:txBody>
-      </p:sp>
-      <p:sp>
-        <p:nvSpPr>
-          <p:cNvPr id="36" name="Rectangle 35">
-            <a:extLst>
-              <a:ext uri="{FF2B5EF4-FFF2-40B4-BE49-F238E27FC236}">
-                <a16:creationId xmlns:a16="http://schemas.microsoft.com/office/drawing/2014/main" id="{58BCB9A5-DCF5-3B43-8436-71689D2DE147}"/>
-              </a:ext>
-            </a:extLst>
-          </p:cNvPr>
-          <p:cNvSpPr/>
-          <p:nvPr/>
-        </p:nvSpPr>
-        <p:spPr>
-          <a:xfrm>
-            <a:off x="9874875" y="5123414"/>
-            <a:ext cx="694579" cy="431515"/>
-          </a:xfrm>
-          <a:prstGeom prst="rect">
-            <a:avLst/>
-          </a:prstGeom>
-          <a:solidFill>
-            <a:schemeClr val="bg1">
-              <a:lumMod val="75000"/>
-            </a:schemeClr>
-          </a:solidFill>
-          <a:ln w="19050">
-            <a:solidFill>
-              <a:schemeClr val="tx1"/>
-            </a:solidFill>
-          </a:ln>
-        </p:spPr>
-        <p:style>
-          <a:lnRef idx="2">
-            <a:schemeClr val="accent1">
-              <a:shade val="50000"/>
-            </a:schemeClr>
-          </a:lnRef>
-          <a:fillRef idx="1">
-            <a:schemeClr val="accent1"/>
-          </a:fillRef>
-          <a:effectRef idx="0">
-            <a:schemeClr val="accent1"/>
-          </a:effectRef>
-          <a:fontRef idx="minor">
-            <a:schemeClr val="lt1"/>
-          </a:fontRef>
-        </p:style>
-        <p:txBody>
-          <a:bodyPr rtlCol="0" anchor="ctr"/>
-          <a:lstStyle/>
-          <a:p>
-            <a:pPr algn="ctr"/>
-            <a:r>
-              <a:rPr lang="en-US" sz="1600" dirty="0">
-                <a:solidFill>
-                  <a:schemeClr val="tx1"/>
-                </a:solidFill>
-              </a:rPr>
-              <a:t>Task 7</a:t>
-            </a:r>
-          </a:p>
-        </p:txBody>
-      </p:sp>
-      <p:sp>
-        <p:nvSpPr>
-          <p:cNvPr id="38" name="Rectangle 37">
-            <a:extLst>
-              <a:ext uri="{FF2B5EF4-FFF2-40B4-BE49-F238E27FC236}">
-                <a16:creationId xmlns:a16="http://schemas.microsoft.com/office/drawing/2014/main" id="{E0923C05-C910-3B42-B647-994A9B068CDE}"/>
-              </a:ext>
-            </a:extLst>
-          </p:cNvPr>
-          <p:cNvSpPr/>
-          <p:nvPr/>
-        </p:nvSpPr>
-        <p:spPr>
-          <a:xfrm>
-            <a:off x="10693274" y="5123414"/>
-            <a:ext cx="694579" cy="431515"/>
-          </a:xfrm>
-          <a:prstGeom prst="rect">
-            <a:avLst/>
-          </a:prstGeom>
-          <a:solidFill>
-            <a:schemeClr val="bg1">
-              <a:lumMod val="50000"/>
-            </a:schemeClr>
-          </a:solidFill>
-          <a:ln w="19050">
-            <a:solidFill>
-              <a:schemeClr val="tx1"/>
-            </a:solidFill>
-          </a:ln>
-        </p:spPr>
-        <p:style>
-          <a:lnRef idx="2">
-            <a:schemeClr val="accent1">
-              <a:shade val="50000"/>
-            </a:schemeClr>
-          </a:lnRef>
-          <a:fillRef idx="1">
-            <a:schemeClr val="accent1"/>
-          </a:fillRef>
-          <a:effectRef idx="0">
-            <a:schemeClr val="accent1"/>
-          </a:effectRef>
-          <a:fontRef idx="minor">
-            <a:schemeClr val="lt1"/>
-          </a:fontRef>
-        </p:style>
-        <p:txBody>
-          <a:bodyPr rtlCol="0" anchor="ctr"/>
-          <a:lstStyle/>
-          <a:p>
-            <a:pPr algn="ctr"/>
-            <a:r>
-              <a:rPr lang="en-US" sz="1600" dirty="0">
-                <a:solidFill>
-                  <a:schemeClr val="tx1"/>
-                </a:solidFill>
-              </a:rPr>
-              <a:t>Task 8</a:t>
-            </a:r>
-          </a:p>
-        </p:txBody>
-      </p:sp>
-      <p:sp>
-        <p:nvSpPr>
-          <p:cNvPr id="40" name="Rectangle 39">
-            <a:extLst>
-              <a:ext uri="{FF2B5EF4-FFF2-40B4-BE49-F238E27FC236}">
-                <a16:creationId xmlns:a16="http://schemas.microsoft.com/office/drawing/2014/main" id="{DA70811D-F871-FC4B-A2B7-00C991D979F3}"/>
-              </a:ext>
-            </a:extLst>
-          </p:cNvPr>
-          <p:cNvSpPr/>
-          <p:nvPr/>
-        </p:nvSpPr>
-        <p:spPr>
-          <a:xfrm>
-            <a:off x="11511673" y="5123414"/>
-            <a:ext cx="290340" cy="431515"/>
-          </a:xfrm>
-          <a:prstGeom prst="rect">
-            <a:avLst/>
-          </a:prstGeom>
-          <a:solidFill>
-            <a:schemeClr val="bg1">
-              <a:lumMod val="95000"/>
-            </a:schemeClr>
-          </a:solidFill>
-          <a:ln w="19050">
-            <a:solidFill>
-              <a:schemeClr val="tx1"/>
-            </a:solidFill>
-          </a:ln>
-        </p:spPr>
-        <p:style>
-          <a:lnRef idx="2">
-            <a:schemeClr val="accent1">
-              <a:shade val="50000"/>
-            </a:schemeClr>
-          </a:lnRef>
-          <a:fillRef idx="1">
-            <a:schemeClr val="accent1"/>
-          </a:fillRef>
-          <a:effectRef idx="0">
-            <a:schemeClr val="accent1"/>
-          </a:effectRef>
-          <a:fontRef idx="minor">
-            <a:schemeClr val="lt1"/>
-          </a:fontRef>
-        </p:style>
-        <p:txBody>
-          <a:bodyPr rtlCol="0" anchor="ctr"/>
-          <a:lstStyle/>
-          <a:p>
-            <a:pPr algn="ctr"/>
-            <a:r>
-              <a:rPr lang="en-US" sz="2000" dirty="0">
-                <a:solidFill>
-                  <a:schemeClr val="tx1"/>
-                </a:solidFill>
-              </a:rPr>
-              <a:t>…</a:t>
-            </a:r>
+            <a:endParaRPr lang="en-US" dirty="0"/>
           </a:p>
         </p:txBody>
       </p:sp>
@@ -5337,10 +3440,10 @@
       </p:sp>
       <p:sp>
         <p:nvSpPr>
-          <p:cNvPr id="42" name="Rectangle 41">
-            <a:extLst>
-              <a:ext uri="{FF2B5EF4-FFF2-40B4-BE49-F238E27FC236}">
-                <a16:creationId xmlns:a16="http://schemas.microsoft.com/office/drawing/2014/main" id="{1593262C-9ABB-0649-80B9-817506FE100B}"/>
+          <p:cNvPr id="4" name="Rectangle 3">
+            <a:extLst>
+              <a:ext uri="{FF2B5EF4-FFF2-40B4-BE49-F238E27FC236}">
+                <a16:creationId xmlns:a16="http://schemas.microsoft.com/office/drawing/2014/main" id="{D2BB76DC-4D75-B54C-BDA2-36E3F6F61606}"/>
               </a:ext>
             </a:extLst>
           </p:cNvPr>
@@ -5349,45 +3452,1879 @@
         </p:nvSpPr>
         <p:spPr>
           <a:xfrm>
-            <a:off x="308222" y="1975222"/>
-            <a:ext cx="11609797" cy="1017141"/>
+            <a:off x="444570" y="1140430"/>
+            <a:ext cx="2727790" cy="431515"/>
           </a:xfrm>
           <a:prstGeom prst="rect">
             <a:avLst/>
           </a:prstGeom>
-          <a:noFill/>
-          <a:ln w="19050"/>
+          <a:solidFill>
+            <a:schemeClr val="bg1">
+              <a:lumMod val="95000"/>
+            </a:schemeClr>
+          </a:solidFill>
+          <a:ln w="19050">
+            <a:solidFill>
+              <a:schemeClr val="tx1"/>
+            </a:solidFill>
+          </a:ln>
         </p:spPr>
         <p:style>
           <a:lnRef idx="2">
-            <a:schemeClr val="dk1"/>
+            <a:schemeClr val="accent1">
+              <a:shade val="50000"/>
+            </a:schemeClr>
           </a:lnRef>
           <a:fillRef idx="1">
-            <a:schemeClr val="lt1"/>
+            <a:schemeClr val="accent1"/>
           </a:fillRef>
           <a:effectRef idx="0">
-            <a:schemeClr val="dk1"/>
+            <a:schemeClr val="accent1"/>
           </a:effectRef>
           <a:fontRef idx="minor">
-            <a:schemeClr val="dk1"/>
+            <a:schemeClr val="lt1"/>
           </a:fontRef>
         </p:style>
         <p:txBody>
           <a:bodyPr rtlCol="0" anchor="ctr"/>
           <a:lstStyle/>
           <a:p>
-            <a:r>
-              <a:rPr lang="en-US" sz="2000" dirty="0"/>
-              <a:t>Static partition with chunk size &gt; 0</a:t>
-            </a:r>
-          </a:p>
-          <a:p>
             <a:pPr algn="ctr"/>
-            <a:endParaRPr lang="en-US" dirty="0"/>
-          </a:p>
+            <a:r>
+              <a:rPr lang="en-US" sz="2000" dirty="0">
+                <a:solidFill>
+                  <a:schemeClr val="tx1"/>
+                </a:solidFill>
+              </a:rPr>
+              <a:t>Worker 1</a:t>
+            </a:r>
+          </a:p>
+        </p:txBody>
+      </p:sp>
+      <p:sp>
+        <p:nvSpPr>
+          <p:cNvPr id="5" name="Rectangle 4">
+            <a:extLst>
+              <a:ext uri="{FF2B5EF4-FFF2-40B4-BE49-F238E27FC236}">
+                <a16:creationId xmlns:a16="http://schemas.microsoft.com/office/drawing/2014/main" id="{D2A41FFB-C265-3543-84B4-59DF1A7E540E}"/>
+              </a:ext>
+            </a:extLst>
+          </p:cNvPr>
+          <p:cNvSpPr/>
+          <p:nvPr/>
+        </p:nvSpPr>
+        <p:spPr>
+          <a:xfrm>
+            <a:off x="3321121" y="1140430"/>
+            <a:ext cx="2727790" cy="431515"/>
+          </a:xfrm>
+          <a:prstGeom prst="rect">
+            <a:avLst/>
+          </a:prstGeom>
+          <a:solidFill>
+            <a:schemeClr val="bg1">
+              <a:lumMod val="85000"/>
+            </a:schemeClr>
+          </a:solidFill>
+          <a:ln w="19050">
+            <a:solidFill>
+              <a:schemeClr val="tx1"/>
+            </a:solidFill>
+          </a:ln>
+        </p:spPr>
+        <p:style>
+          <a:lnRef idx="2">
+            <a:schemeClr val="accent1">
+              <a:shade val="50000"/>
+            </a:schemeClr>
+          </a:lnRef>
+          <a:fillRef idx="1">
+            <a:schemeClr val="accent1"/>
+          </a:fillRef>
+          <a:effectRef idx="0">
+            <a:schemeClr val="accent1"/>
+          </a:effectRef>
+          <a:fontRef idx="minor">
+            <a:schemeClr val="lt1"/>
+          </a:fontRef>
+        </p:style>
+        <p:txBody>
+          <a:bodyPr rtlCol="0" anchor="ctr"/>
+          <a:lstStyle/>
           <a:p>
             <a:pPr algn="ctr"/>
-            <a:endParaRPr lang="en-US" dirty="0"/>
+            <a:r>
+              <a:rPr lang="en-US" sz="2000" dirty="0">
+                <a:solidFill>
+                  <a:schemeClr val="tx1"/>
+                </a:solidFill>
+              </a:rPr>
+              <a:t>Worker 2</a:t>
+            </a:r>
+          </a:p>
+        </p:txBody>
+      </p:sp>
+      <p:sp>
+        <p:nvSpPr>
+          <p:cNvPr id="6" name="Rectangle 5">
+            <a:extLst>
+              <a:ext uri="{FF2B5EF4-FFF2-40B4-BE49-F238E27FC236}">
+                <a16:creationId xmlns:a16="http://schemas.microsoft.com/office/drawing/2014/main" id="{9EE3F200-E502-3E47-A387-410608F33FB0}"/>
+              </a:ext>
+            </a:extLst>
+          </p:cNvPr>
+          <p:cNvSpPr/>
+          <p:nvPr/>
+        </p:nvSpPr>
+        <p:spPr>
+          <a:xfrm>
+            <a:off x="6197672" y="1140430"/>
+            <a:ext cx="2727790" cy="431515"/>
+          </a:xfrm>
+          <a:prstGeom prst="rect">
+            <a:avLst/>
+          </a:prstGeom>
+          <a:solidFill>
+            <a:schemeClr val="bg1">
+              <a:lumMod val="75000"/>
+            </a:schemeClr>
+          </a:solidFill>
+          <a:ln w="19050">
+            <a:solidFill>
+              <a:schemeClr val="tx1"/>
+            </a:solidFill>
+          </a:ln>
+        </p:spPr>
+        <p:style>
+          <a:lnRef idx="2">
+            <a:schemeClr val="accent1">
+              <a:shade val="50000"/>
+            </a:schemeClr>
+          </a:lnRef>
+          <a:fillRef idx="1">
+            <a:schemeClr val="accent1"/>
+          </a:fillRef>
+          <a:effectRef idx="0">
+            <a:schemeClr val="accent1"/>
+          </a:effectRef>
+          <a:fontRef idx="minor">
+            <a:schemeClr val="lt1"/>
+          </a:fontRef>
+        </p:style>
+        <p:txBody>
+          <a:bodyPr rtlCol="0" anchor="ctr"/>
+          <a:lstStyle/>
+          <a:p>
+            <a:pPr algn="ctr"/>
+            <a:r>
+              <a:rPr lang="en-US" sz="2000" dirty="0">
+                <a:solidFill>
+                  <a:schemeClr val="tx1"/>
+                </a:solidFill>
+              </a:rPr>
+              <a:t>Worker 3</a:t>
+            </a:r>
+          </a:p>
+        </p:txBody>
+      </p:sp>
+      <p:sp>
+        <p:nvSpPr>
+          <p:cNvPr id="7" name="Rectangle 6">
+            <a:extLst>
+              <a:ext uri="{FF2B5EF4-FFF2-40B4-BE49-F238E27FC236}">
+                <a16:creationId xmlns:a16="http://schemas.microsoft.com/office/drawing/2014/main" id="{074AC4B3-97AC-7040-A44B-B98C894606BA}"/>
+              </a:ext>
+            </a:extLst>
+          </p:cNvPr>
+          <p:cNvSpPr/>
+          <p:nvPr/>
+        </p:nvSpPr>
+        <p:spPr>
+          <a:xfrm>
+            <a:off x="9074223" y="1140430"/>
+            <a:ext cx="2727790" cy="431515"/>
+          </a:xfrm>
+          <a:prstGeom prst="rect">
+            <a:avLst/>
+          </a:prstGeom>
+          <a:solidFill>
+            <a:schemeClr val="bg1">
+              <a:lumMod val="50000"/>
+            </a:schemeClr>
+          </a:solidFill>
+          <a:ln w="19050">
+            <a:solidFill>
+              <a:schemeClr val="tx1"/>
+            </a:solidFill>
+          </a:ln>
+        </p:spPr>
+        <p:style>
+          <a:lnRef idx="2">
+            <a:schemeClr val="accent1">
+              <a:shade val="50000"/>
+            </a:schemeClr>
+          </a:lnRef>
+          <a:fillRef idx="1">
+            <a:schemeClr val="accent1"/>
+          </a:fillRef>
+          <a:effectRef idx="0">
+            <a:schemeClr val="accent1"/>
+          </a:effectRef>
+          <a:fontRef idx="minor">
+            <a:schemeClr val="lt1"/>
+          </a:fontRef>
+        </p:style>
+        <p:txBody>
+          <a:bodyPr rtlCol="0" anchor="ctr"/>
+          <a:lstStyle/>
+          <a:p>
+            <a:pPr algn="ctr"/>
+            <a:r>
+              <a:rPr lang="en-US" sz="2000" dirty="0">
+                <a:solidFill>
+                  <a:schemeClr val="tx1"/>
+                </a:solidFill>
+              </a:rPr>
+              <a:t>Worker 4</a:t>
+            </a:r>
+          </a:p>
+        </p:txBody>
+      </p:sp>
+      <p:sp>
+        <p:nvSpPr>
+          <p:cNvPr id="8" name="Rectangle 7">
+            <a:extLst>
+              <a:ext uri="{FF2B5EF4-FFF2-40B4-BE49-F238E27FC236}">
+                <a16:creationId xmlns:a16="http://schemas.microsoft.com/office/drawing/2014/main" id="{4F9DA6FF-F653-9545-BE52-1A9BCB7B22CF}"/>
+              </a:ext>
+            </a:extLst>
+          </p:cNvPr>
+          <p:cNvSpPr/>
+          <p:nvPr/>
+        </p:nvSpPr>
+        <p:spPr>
+          <a:xfrm>
+            <a:off x="444570" y="3749231"/>
+            <a:ext cx="1302037" cy="431515"/>
+          </a:xfrm>
+          <a:prstGeom prst="rect">
+            <a:avLst/>
+          </a:prstGeom>
+          <a:solidFill>
+            <a:schemeClr val="bg1">
+              <a:lumMod val="95000"/>
+            </a:schemeClr>
+          </a:solidFill>
+          <a:ln w="19050">
+            <a:solidFill>
+              <a:schemeClr val="tx1"/>
+            </a:solidFill>
+          </a:ln>
+        </p:spPr>
+        <p:style>
+          <a:lnRef idx="2">
+            <a:schemeClr val="accent1">
+              <a:shade val="50000"/>
+            </a:schemeClr>
+          </a:lnRef>
+          <a:fillRef idx="1">
+            <a:schemeClr val="accent1"/>
+          </a:fillRef>
+          <a:effectRef idx="0">
+            <a:schemeClr val="accent1"/>
+          </a:effectRef>
+          <a:fontRef idx="minor">
+            <a:schemeClr val="lt1"/>
+          </a:fontRef>
+        </p:style>
+        <p:txBody>
+          <a:bodyPr rtlCol="0" anchor="ctr"/>
+          <a:lstStyle/>
+          <a:p>
+            <a:pPr algn="ctr"/>
+            <a:r>
+              <a:rPr lang="en-US" sz="2000" dirty="0">
+                <a:solidFill>
+                  <a:schemeClr val="tx1"/>
+                </a:solidFill>
+              </a:rPr>
+              <a:t>Worker 1</a:t>
+            </a:r>
+          </a:p>
+        </p:txBody>
+      </p:sp>
+      <p:sp>
+        <p:nvSpPr>
+          <p:cNvPr id="9" name="Rectangle 8">
+            <a:extLst>
+              <a:ext uri="{FF2B5EF4-FFF2-40B4-BE49-F238E27FC236}">
+                <a16:creationId xmlns:a16="http://schemas.microsoft.com/office/drawing/2014/main" id="{D09C8341-B720-1B4F-8181-A813D095C4AD}"/>
+              </a:ext>
+            </a:extLst>
+          </p:cNvPr>
+          <p:cNvSpPr/>
+          <p:nvPr/>
+        </p:nvSpPr>
+        <p:spPr>
+          <a:xfrm>
+            <a:off x="444570" y="2432421"/>
+            <a:ext cx="973903" cy="431515"/>
+          </a:xfrm>
+          <a:prstGeom prst="rect">
+            <a:avLst/>
+          </a:prstGeom>
+          <a:solidFill>
+            <a:schemeClr val="bg1">
+              <a:lumMod val="95000"/>
+            </a:schemeClr>
+          </a:solidFill>
+          <a:ln w="19050">
+            <a:solidFill>
+              <a:schemeClr val="tx1"/>
+            </a:solidFill>
+          </a:ln>
+        </p:spPr>
+        <p:style>
+          <a:lnRef idx="2">
+            <a:schemeClr val="accent1">
+              <a:shade val="50000"/>
+            </a:schemeClr>
+          </a:lnRef>
+          <a:fillRef idx="1">
+            <a:schemeClr val="accent1"/>
+          </a:fillRef>
+          <a:effectRef idx="0">
+            <a:schemeClr val="accent1"/>
+          </a:effectRef>
+          <a:fontRef idx="minor">
+            <a:schemeClr val="lt1"/>
+          </a:fontRef>
+        </p:style>
+        <p:txBody>
+          <a:bodyPr rtlCol="0" anchor="ctr"/>
+          <a:lstStyle/>
+          <a:p>
+            <a:pPr algn="ctr"/>
+            <a:r>
+              <a:rPr lang="en-US" sz="1600" dirty="0">
+                <a:solidFill>
+                  <a:schemeClr val="tx1"/>
+                </a:solidFill>
+              </a:rPr>
+              <a:t>Worker 1</a:t>
+            </a:r>
+          </a:p>
+        </p:txBody>
+      </p:sp>
+      <p:sp>
+        <p:nvSpPr>
+          <p:cNvPr id="10" name="Rectangle 9">
+            <a:extLst>
+              <a:ext uri="{FF2B5EF4-FFF2-40B4-BE49-F238E27FC236}">
+                <a16:creationId xmlns:a16="http://schemas.microsoft.com/office/drawing/2014/main" id="{AD7C6028-A883-0C47-B71A-3CA50AB724B5}"/>
+              </a:ext>
+            </a:extLst>
+          </p:cNvPr>
+          <p:cNvSpPr/>
+          <p:nvPr/>
+        </p:nvSpPr>
+        <p:spPr>
+          <a:xfrm>
+            <a:off x="1553966" y="2432421"/>
+            <a:ext cx="973903" cy="431515"/>
+          </a:xfrm>
+          <a:prstGeom prst="rect">
+            <a:avLst/>
+          </a:prstGeom>
+          <a:solidFill>
+            <a:schemeClr val="bg1">
+              <a:lumMod val="85000"/>
+            </a:schemeClr>
+          </a:solidFill>
+          <a:ln w="19050">
+            <a:solidFill>
+              <a:schemeClr val="tx1"/>
+            </a:solidFill>
+          </a:ln>
+        </p:spPr>
+        <p:style>
+          <a:lnRef idx="2">
+            <a:schemeClr val="accent1">
+              <a:shade val="50000"/>
+            </a:schemeClr>
+          </a:lnRef>
+          <a:fillRef idx="1">
+            <a:schemeClr val="accent1"/>
+          </a:fillRef>
+          <a:effectRef idx="0">
+            <a:schemeClr val="accent1"/>
+          </a:effectRef>
+          <a:fontRef idx="minor">
+            <a:schemeClr val="lt1"/>
+          </a:fontRef>
+        </p:style>
+        <p:txBody>
+          <a:bodyPr rtlCol="0" anchor="ctr"/>
+          <a:lstStyle/>
+          <a:p>
+            <a:pPr algn="ctr"/>
+            <a:r>
+              <a:rPr lang="en-US" sz="1600" dirty="0">
+                <a:solidFill>
+                  <a:schemeClr val="tx1"/>
+                </a:solidFill>
+              </a:rPr>
+              <a:t>Worker 2</a:t>
+            </a:r>
+          </a:p>
+        </p:txBody>
+      </p:sp>
+      <p:sp>
+        <p:nvSpPr>
+          <p:cNvPr id="11" name="Rectangle 10">
+            <a:extLst>
+              <a:ext uri="{FF2B5EF4-FFF2-40B4-BE49-F238E27FC236}">
+                <a16:creationId xmlns:a16="http://schemas.microsoft.com/office/drawing/2014/main" id="{4DE9CF44-7177-584F-90C6-730CCA972ED0}"/>
+              </a:ext>
+            </a:extLst>
+          </p:cNvPr>
+          <p:cNvSpPr/>
+          <p:nvPr/>
+        </p:nvSpPr>
+        <p:spPr>
+          <a:xfrm>
+            <a:off x="2663362" y="2432421"/>
+            <a:ext cx="973903" cy="431515"/>
+          </a:xfrm>
+          <a:prstGeom prst="rect">
+            <a:avLst/>
+          </a:prstGeom>
+          <a:solidFill>
+            <a:schemeClr val="bg1">
+              <a:lumMod val="75000"/>
+            </a:schemeClr>
+          </a:solidFill>
+          <a:ln w="19050">
+            <a:solidFill>
+              <a:schemeClr val="tx1"/>
+            </a:solidFill>
+          </a:ln>
+        </p:spPr>
+        <p:style>
+          <a:lnRef idx="2">
+            <a:schemeClr val="accent1">
+              <a:shade val="50000"/>
+            </a:schemeClr>
+          </a:lnRef>
+          <a:fillRef idx="1">
+            <a:schemeClr val="accent1"/>
+          </a:fillRef>
+          <a:effectRef idx="0">
+            <a:schemeClr val="accent1"/>
+          </a:effectRef>
+          <a:fontRef idx="minor">
+            <a:schemeClr val="lt1"/>
+          </a:fontRef>
+        </p:style>
+        <p:txBody>
+          <a:bodyPr rtlCol="0" anchor="ctr"/>
+          <a:lstStyle/>
+          <a:p>
+            <a:pPr algn="ctr"/>
+            <a:r>
+              <a:rPr lang="en-US" sz="1600" dirty="0">
+                <a:solidFill>
+                  <a:schemeClr val="tx1"/>
+                </a:solidFill>
+              </a:rPr>
+              <a:t>Worker 3</a:t>
+            </a:r>
+          </a:p>
+        </p:txBody>
+      </p:sp>
+      <p:sp>
+        <p:nvSpPr>
+          <p:cNvPr id="12" name="Rectangle 11">
+            <a:extLst>
+              <a:ext uri="{FF2B5EF4-FFF2-40B4-BE49-F238E27FC236}">
+                <a16:creationId xmlns:a16="http://schemas.microsoft.com/office/drawing/2014/main" id="{755837B1-0036-CA49-A5A6-96A83959452C}"/>
+              </a:ext>
+            </a:extLst>
+          </p:cNvPr>
+          <p:cNvSpPr/>
+          <p:nvPr/>
+        </p:nvSpPr>
+        <p:spPr>
+          <a:xfrm>
+            <a:off x="3772758" y="2432421"/>
+            <a:ext cx="973903" cy="431515"/>
+          </a:xfrm>
+          <a:prstGeom prst="rect">
+            <a:avLst/>
+          </a:prstGeom>
+          <a:solidFill>
+            <a:schemeClr val="bg1">
+              <a:lumMod val="50000"/>
+            </a:schemeClr>
+          </a:solidFill>
+          <a:ln w="19050">
+            <a:solidFill>
+              <a:schemeClr val="tx1"/>
+            </a:solidFill>
+          </a:ln>
+        </p:spPr>
+        <p:style>
+          <a:lnRef idx="2">
+            <a:schemeClr val="accent1">
+              <a:shade val="50000"/>
+            </a:schemeClr>
+          </a:lnRef>
+          <a:fillRef idx="1">
+            <a:schemeClr val="accent1"/>
+          </a:fillRef>
+          <a:effectRef idx="0">
+            <a:schemeClr val="accent1"/>
+          </a:effectRef>
+          <a:fontRef idx="minor">
+            <a:schemeClr val="lt1"/>
+          </a:fontRef>
+        </p:style>
+        <p:txBody>
+          <a:bodyPr rtlCol="0" anchor="ctr"/>
+          <a:lstStyle/>
+          <a:p>
+            <a:pPr algn="ctr"/>
+            <a:r>
+              <a:rPr lang="en-US" sz="1600" dirty="0">
+                <a:solidFill>
+                  <a:schemeClr val="tx1"/>
+                </a:solidFill>
+              </a:rPr>
+              <a:t>Worker 4</a:t>
+            </a:r>
+          </a:p>
+        </p:txBody>
+      </p:sp>
+      <p:sp>
+        <p:nvSpPr>
+          <p:cNvPr id="13" name="Rectangle 12">
+            <a:extLst>
+              <a:ext uri="{FF2B5EF4-FFF2-40B4-BE49-F238E27FC236}">
+                <a16:creationId xmlns:a16="http://schemas.microsoft.com/office/drawing/2014/main" id="{C2BAC4D1-09B2-8F46-BB36-2982EE5498DB}"/>
+              </a:ext>
+            </a:extLst>
+          </p:cNvPr>
+          <p:cNvSpPr/>
+          <p:nvPr/>
+        </p:nvSpPr>
+        <p:spPr>
+          <a:xfrm>
+            <a:off x="5017647" y="2432421"/>
+            <a:ext cx="973903" cy="431515"/>
+          </a:xfrm>
+          <a:prstGeom prst="rect">
+            <a:avLst/>
+          </a:prstGeom>
+          <a:solidFill>
+            <a:schemeClr val="bg1">
+              <a:lumMod val="95000"/>
+            </a:schemeClr>
+          </a:solidFill>
+          <a:ln w="19050">
+            <a:solidFill>
+              <a:schemeClr val="tx1"/>
+            </a:solidFill>
+          </a:ln>
+        </p:spPr>
+        <p:style>
+          <a:lnRef idx="2">
+            <a:schemeClr val="accent1">
+              <a:shade val="50000"/>
+            </a:schemeClr>
+          </a:lnRef>
+          <a:fillRef idx="1">
+            <a:schemeClr val="accent1"/>
+          </a:fillRef>
+          <a:effectRef idx="0">
+            <a:schemeClr val="accent1"/>
+          </a:effectRef>
+          <a:fontRef idx="minor">
+            <a:schemeClr val="lt1"/>
+          </a:fontRef>
+        </p:style>
+        <p:txBody>
+          <a:bodyPr rtlCol="0" anchor="ctr"/>
+          <a:lstStyle/>
+          <a:p>
+            <a:pPr algn="ctr"/>
+            <a:r>
+              <a:rPr lang="en-US" sz="1600" dirty="0">
+                <a:solidFill>
+                  <a:schemeClr val="tx1"/>
+                </a:solidFill>
+              </a:rPr>
+              <a:t>Worker 1</a:t>
+            </a:r>
+          </a:p>
+        </p:txBody>
+      </p:sp>
+      <p:sp>
+        <p:nvSpPr>
+          <p:cNvPr id="14" name="Rectangle 13">
+            <a:extLst>
+              <a:ext uri="{FF2B5EF4-FFF2-40B4-BE49-F238E27FC236}">
+                <a16:creationId xmlns:a16="http://schemas.microsoft.com/office/drawing/2014/main" id="{9FF9EE6A-28F3-8645-9B12-E1E076B68F9A}"/>
+              </a:ext>
+            </a:extLst>
+          </p:cNvPr>
+          <p:cNvSpPr/>
+          <p:nvPr/>
+        </p:nvSpPr>
+        <p:spPr>
+          <a:xfrm>
+            <a:off x="6157865" y="2432421"/>
+            <a:ext cx="973903" cy="431515"/>
+          </a:xfrm>
+          <a:prstGeom prst="rect">
+            <a:avLst/>
+          </a:prstGeom>
+          <a:solidFill>
+            <a:schemeClr val="bg1">
+              <a:lumMod val="85000"/>
+            </a:schemeClr>
+          </a:solidFill>
+          <a:ln w="19050">
+            <a:solidFill>
+              <a:schemeClr val="tx1"/>
+            </a:solidFill>
+          </a:ln>
+        </p:spPr>
+        <p:style>
+          <a:lnRef idx="2">
+            <a:schemeClr val="accent1">
+              <a:shade val="50000"/>
+            </a:schemeClr>
+          </a:lnRef>
+          <a:fillRef idx="1">
+            <a:schemeClr val="accent1"/>
+          </a:fillRef>
+          <a:effectRef idx="0">
+            <a:schemeClr val="accent1"/>
+          </a:effectRef>
+          <a:fontRef idx="minor">
+            <a:schemeClr val="lt1"/>
+          </a:fontRef>
+        </p:style>
+        <p:txBody>
+          <a:bodyPr rtlCol="0" anchor="ctr"/>
+          <a:lstStyle/>
+          <a:p>
+            <a:pPr algn="ctr"/>
+            <a:r>
+              <a:rPr lang="en-US" sz="1600" dirty="0">
+                <a:solidFill>
+                  <a:schemeClr val="tx1"/>
+                </a:solidFill>
+              </a:rPr>
+              <a:t>Worker 2</a:t>
+            </a:r>
+          </a:p>
+        </p:txBody>
+      </p:sp>
+      <p:sp>
+        <p:nvSpPr>
+          <p:cNvPr id="15" name="Rectangle 14">
+            <a:extLst>
+              <a:ext uri="{FF2B5EF4-FFF2-40B4-BE49-F238E27FC236}">
+                <a16:creationId xmlns:a16="http://schemas.microsoft.com/office/drawing/2014/main" id="{61068EE1-BB58-AE4F-8971-70CDB1176ED7}"/>
+              </a:ext>
+            </a:extLst>
+          </p:cNvPr>
+          <p:cNvSpPr/>
+          <p:nvPr/>
+        </p:nvSpPr>
+        <p:spPr>
+          <a:xfrm>
+            <a:off x="7287809" y="2432421"/>
+            <a:ext cx="973903" cy="431515"/>
+          </a:xfrm>
+          <a:prstGeom prst="rect">
+            <a:avLst/>
+          </a:prstGeom>
+          <a:solidFill>
+            <a:schemeClr val="bg1">
+              <a:lumMod val="75000"/>
+            </a:schemeClr>
+          </a:solidFill>
+          <a:ln w="19050">
+            <a:solidFill>
+              <a:schemeClr val="tx1"/>
+            </a:solidFill>
+          </a:ln>
+        </p:spPr>
+        <p:style>
+          <a:lnRef idx="2">
+            <a:schemeClr val="accent1">
+              <a:shade val="50000"/>
+            </a:schemeClr>
+          </a:lnRef>
+          <a:fillRef idx="1">
+            <a:schemeClr val="accent1"/>
+          </a:fillRef>
+          <a:effectRef idx="0">
+            <a:schemeClr val="accent1"/>
+          </a:effectRef>
+          <a:fontRef idx="minor">
+            <a:schemeClr val="lt1"/>
+          </a:fontRef>
+        </p:style>
+        <p:txBody>
+          <a:bodyPr rtlCol="0" anchor="ctr"/>
+          <a:lstStyle/>
+          <a:p>
+            <a:pPr algn="ctr"/>
+            <a:r>
+              <a:rPr lang="en-US" sz="1600" dirty="0">
+                <a:solidFill>
+                  <a:schemeClr val="tx1"/>
+                </a:solidFill>
+              </a:rPr>
+              <a:t>Worker 3</a:t>
+            </a:r>
+          </a:p>
+        </p:txBody>
+      </p:sp>
+      <p:sp>
+        <p:nvSpPr>
+          <p:cNvPr id="16" name="Rectangle 15">
+            <a:extLst>
+              <a:ext uri="{FF2B5EF4-FFF2-40B4-BE49-F238E27FC236}">
+                <a16:creationId xmlns:a16="http://schemas.microsoft.com/office/drawing/2014/main" id="{A130D459-6F29-BF4D-B867-CBE706EE62E6}"/>
+              </a:ext>
+            </a:extLst>
+          </p:cNvPr>
+          <p:cNvSpPr/>
+          <p:nvPr/>
+        </p:nvSpPr>
+        <p:spPr>
+          <a:xfrm>
+            <a:off x="8428027" y="2432421"/>
+            <a:ext cx="973903" cy="431515"/>
+          </a:xfrm>
+          <a:prstGeom prst="rect">
+            <a:avLst/>
+          </a:prstGeom>
+          <a:solidFill>
+            <a:schemeClr val="bg1">
+              <a:lumMod val="50000"/>
+            </a:schemeClr>
+          </a:solidFill>
+          <a:ln w="19050">
+            <a:solidFill>
+              <a:schemeClr val="tx1"/>
+            </a:solidFill>
+          </a:ln>
+        </p:spPr>
+        <p:style>
+          <a:lnRef idx="2">
+            <a:schemeClr val="accent1">
+              <a:shade val="50000"/>
+            </a:schemeClr>
+          </a:lnRef>
+          <a:fillRef idx="1">
+            <a:schemeClr val="accent1"/>
+          </a:fillRef>
+          <a:effectRef idx="0">
+            <a:schemeClr val="accent1"/>
+          </a:effectRef>
+          <a:fontRef idx="minor">
+            <a:schemeClr val="lt1"/>
+          </a:fontRef>
+        </p:style>
+        <p:txBody>
+          <a:bodyPr rtlCol="0" anchor="ctr"/>
+          <a:lstStyle/>
+          <a:p>
+            <a:pPr algn="ctr"/>
+            <a:r>
+              <a:rPr lang="en-US" sz="1600" dirty="0">
+                <a:solidFill>
+                  <a:schemeClr val="tx1"/>
+                </a:solidFill>
+              </a:rPr>
+              <a:t>Worker 4</a:t>
+            </a:r>
+          </a:p>
+        </p:txBody>
+      </p:sp>
+      <p:sp>
+        <p:nvSpPr>
+          <p:cNvPr id="17" name="Rectangle 16">
+            <a:extLst>
+              <a:ext uri="{FF2B5EF4-FFF2-40B4-BE49-F238E27FC236}">
+                <a16:creationId xmlns:a16="http://schemas.microsoft.com/office/drawing/2014/main" id="{E295A9D2-968F-654D-AEA8-42E8A3BB9426}"/>
+              </a:ext>
+            </a:extLst>
+          </p:cNvPr>
+          <p:cNvSpPr/>
+          <p:nvPr/>
+        </p:nvSpPr>
+        <p:spPr>
+          <a:xfrm>
+            <a:off x="9664131" y="2432421"/>
+            <a:ext cx="973903" cy="431515"/>
+          </a:xfrm>
+          <a:prstGeom prst="rect">
+            <a:avLst/>
+          </a:prstGeom>
+          <a:solidFill>
+            <a:schemeClr val="bg1">
+              <a:lumMod val="95000"/>
+            </a:schemeClr>
+          </a:solidFill>
+          <a:ln w="19050">
+            <a:solidFill>
+              <a:schemeClr val="tx1"/>
+            </a:solidFill>
+          </a:ln>
+        </p:spPr>
+        <p:style>
+          <a:lnRef idx="2">
+            <a:schemeClr val="accent1">
+              <a:shade val="50000"/>
+            </a:schemeClr>
+          </a:lnRef>
+          <a:fillRef idx="1">
+            <a:schemeClr val="accent1"/>
+          </a:fillRef>
+          <a:effectRef idx="0">
+            <a:schemeClr val="accent1"/>
+          </a:effectRef>
+          <a:fontRef idx="minor">
+            <a:schemeClr val="lt1"/>
+          </a:fontRef>
+        </p:style>
+        <p:txBody>
+          <a:bodyPr rtlCol="0" anchor="ctr"/>
+          <a:lstStyle/>
+          <a:p>
+            <a:pPr algn="ctr"/>
+            <a:r>
+              <a:rPr lang="en-US" sz="1600" dirty="0">
+                <a:solidFill>
+                  <a:schemeClr val="tx1"/>
+                </a:solidFill>
+              </a:rPr>
+              <a:t>Worker 1</a:t>
+            </a:r>
+          </a:p>
+        </p:txBody>
+      </p:sp>
+      <p:sp>
+        <p:nvSpPr>
+          <p:cNvPr id="18" name="Rectangle 17">
+            <a:extLst>
+              <a:ext uri="{FF2B5EF4-FFF2-40B4-BE49-F238E27FC236}">
+                <a16:creationId xmlns:a16="http://schemas.microsoft.com/office/drawing/2014/main" id="{4D0A8985-B2AE-EA4F-A734-5523D9FF55BA}"/>
+              </a:ext>
+            </a:extLst>
+          </p:cNvPr>
+          <p:cNvSpPr/>
+          <p:nvPr/>
+        </p:nvSpPr>
+        <p:spPr>
+          <a:xfrm>
+            <a:off x="10773527" y="2432421"/>
+            <a:ext cx="1028486" cy="431515"/>
+          </a:xfrm>
+          <a:prstGeom prst="rect">
+            <a:avLst/>
+          </a:prstGeom>
+          <a:solidFill>
+            <a:schemeClr val="bg1">
+              <a:lumMod val="85000"/>
+            </a:schemeClr>
+          </a:solidFill>
+          <a:ln w="19050">
+            <a:solidFill>
+              <a:schemeClr val="tx1"/>
+            </a:solidFill>
+          </a:ln>
+        </p:spPr>
+        <p:style>
+          <a:lnRef idx="2">
+            <a:schemeClr val="accent1">
+              <a:shade val="50000"/>
+            </a:schemeClr>
+          </a:lnRef>
+          <a:fillRef idx="1">
+            <a:schemeClr val="accent1"/>
+          </a:fillRef>
+          <a:effectRef idx="0">
+            <a:schemeClr val="accent1"/>
+          </a:effectRef>
+          <a:fontRef idx="minor">
+            <a:schemeClr val="lt1"/>
+          </a:fontRef>
+        </p:style>
+        <p:txBody>
+          <a:bodyPr rtlCol="0" anchor="ctr"/>
+          <a:lstStyle/>
+          <a:p>
+            <a:pPr algn="ctr"/>
+            <a:r>
+              <a:rPr lang="en-US" sz="1600" dirty="0">
+                <a:solidFill>
+                  <a:schemeClr val="tx1"/>
+                </a:solidFill>
+              </a:rPr>
+              <a:t> Worker 2 </a:t>
+            </a:r>
+          </a:p>
+        </p:txBody>
+      </p:sp>
+      <p:sp>
+        <p:nvSpPr>
+          <p:cNvPr id="21" name="Rectangle 20">
+            <a:extLst>
+              <a:ext uri="{FF2B5EF4-FFF2-40B4-BE49-F238E27FC236}">
+                <a16:creationId xmlns:a16="http://schemas.microsoft.com/office/drawing/2014/main" id="{23B81FF6-FB32-564C-A443-EE8280F6551C}"/>
+              </a:ext>
+            </a:extLst>
+          </p:cNvPr>
+          <p:cNvSpPr/>
+          <p:nvPr/>
+        </p:nvSpPr>
+        <p:spPr>
+          <a:xfrm>
+            <a:off x="1901146" y="3749231"/>
+            <a:ext cx="1302037" cy="431515"/>
+          </a:xfrm>
+          <a:prstGeom prst="rect">
+            <a:avLst/>
+          </a:prstGeom>
+          <a:solidFill>
+            <a:schemeClr val="bg1">
+              <a:lumMod val="75000"/>
+            </a:schemeClr>
+          </a:solidFill>
+          <a:ln w="19050">
+            <a:solidFill>
+              <a:schemeClr val="tx1"/>
+            </a:solidFill>
+          </a:ln>
+        </p:spPr>
+        <p:style>
+          <a:lnRef idx="2">
+            <a:schemeClr val="accent1">
+              <a:shade val="50000"/>
+            </a:schemeClr>
+          </a:lnRef>
+          <a:fillRef idx="1">
+            <a:schemeClr val="accent1"/>
+          </a:fillRef>
+          <a:effectRef idx="0">
+            <a:schemeClr val="accent1"/>
+          </a:effectRef>
+          <a:fontRef idx="minor">
+            <a:schemeClr val="lt1"/>
+          </a:fontRef>
+        </p:style>
+        <p:txBody>
+          <a:bodyPr rtlCol="0" anchor="ctr"/>
+          <a:lstStyle/>
+          <a:p>
+            <a:pPr algn="ctr"/>
+            <a:r>
+              <a:rPr lang="en-US" sz="2000" dirty="0">
+                <a:solidFill>
+                  <a:schemeClr val="tx1"/>
+                </a:solidFill>
+              </a:rPr>
+              <a:t>Worker 2</a:t>
+            </a:r>
+          </a:p>
+        </p:txBody>
+      </p:sp>
+      <p:sp>
+        <p:nvSpPr>
+          <p:cNvPr id="22" name="Rectangle 21">
+            <a:extLst>
+              <a:ext uri="{FF2B5EF4-FFF2-40B4-BE49-F238E27FC236}">
+                <a16:creationId xmlns:a16="http://schemas.microsoft.com/office/drawing/2014/main" id="{496C9E59-CE12-154D-B644-73329B1AF548}"/>
+              </a:ext>
+            </a:extLst>
+          </p:cNvPr>
+          <p:cNvSpPr/>
+          <p:nvPr/>
+        </p:nvSpPr>
+        <p:spPr>
+          <a:xfrm>
+            <a:off x="3357722" y="3749231"/>
+            <a:ext cx="1302037" cy="431515"/>
+          </a:xfrm>
+          <a:prstGeom prst="rect">
+            <a:avLst/>
+          </a:prstGeom>
+          <a:solidFill>
+            <a:schemeClr val="bg1">
+              <a:lumMod val="50000"/>
+            </a:schemeClr>
+          </a:solidFill>
+          <a:ln w="19050">
+            <a:solidFill>
+              <a:schemeClr val="tx1"/>
+            </a:solidFill>
+          </a:ln>
+        </p:spPr>
+        <p:style>
+          <a:lnRef idx="2">
+            <a:schemeClr val="accent1">
+              <a:shade val="50000"/>
+            </a:schemeClr>
+          </a:lnRef>
+          <a:fillRef idx="1">
+            <a:schemeClr val="accent1"/>
+          </a:fillRef>
+          <a:effectRef idx="0">
+            <a:schemeClr val="accent1"/>
+          </a:effectRef>
+          <a:fontRef idx="minor">
+            <a:schemeClr val="lt1"/>
+          </a:fontRef>
+        </p:style>
+        <p:txBody>
+          <a:bodyPr rtlCol="0" anchor="ctr"/>
+          <a:lstStyle/>
+          <a:p>
+            <a:pPr algn="ctr"/>
+            <a:r>
+              <a:rPr lang="en-US" sz="2000" dirty="0">
+                <a:solidFill>
+                  <a:schemeClr val="tx1"/>
+                </a:solidFill>
+              </a:rPr>
+              <a:t>Worker 3</a:t>
+            </a:r>
+          </a:p>
+        </p:txBody>
+      </p:sp>
+      <p:sp>
+        <p:nvSpPr>
+          <p:cNvPr id="24" name="Rectangle 23">
+            <a:extLst>
+              <a:ext uri="{FF2B5EF4-FFF2-40B4-BE49-F238E27FC236}">
+                <a16:creationId xmlns:a16="http://schemas.microsoft.com/office/drawing/2014/main" id="{C9857138-58C5-574B-8061-77344AA8BDA6}"/>
+              </a:ext>
+            </a:extLst>
+          </p:cNvPr>
+          <p:cNvSpPr/>
+          <p:nvPr/>
+        </p:nvSpPr>
+        <p:spPr>
+          <a:xfrm>
+            <a:off x="4814298" y="3749231"/>
+            <a:ext cx="1302037" cy="431515"/>
+          </a:xfrm>
+          <a:prstGeom prst="rect">
+            <a:avLst/>
+          </a:prstGeom>
+          <a:solidFill>
+            <a:schemeClr val="bg1">
+              <a:lumMod val="75000"/>
+            </a:schemeClr>
+          </a:solidFill>
+          <a:ln w="19050">
+            <a:solidFill>
+              <a:schemeClr val="tx1"/>
+            </a:solidFill>
+          </a:ln>
+        </p:spPr>
+        <p:style>
+          <a:lnRef idx="2">
+            <a:schemeClr val="accent1">
+              <a:shade val="50000"/>
+            </a:schemeClr>
+          </a:lnRef>
+          <a:fillRef idx="1">
+            <a:schemeClr val="accent1"/>
+          </a:fillRef>
+          <a:effectRef idx="0">
+            <a:schemeClr val="accent1"/>
+          </a:effectRef>
+          <a:fontRef idx="minor">
+            <a:schemeClr val="lt1"/>
+          </a:fontRef>
+        </p:style>
+        <p:txBody>
+          <a:bodyPr rtlCol="0" anchor="ctr"/>
+          <a:lstStyle/>
+          <a:p>
+            <a:pPr algn="ctr"/>
+            <a:r>
+              <a:rPr lang="en-US" sz="2000" dirty="0">
+                <a:solidFill>
+                  <a:schemeClr val="tx1"/>
+                </a:solidFill>
+              </a:rPr>
+              <a:t>Worker 4</a:t>
+            </a:r>
+          </a:p>
+        </p:txBody>
+      </p:sp>
+      <p:sp>
+        <p:nvSpPr>
+          <p:cNvPr id="25" name="Rectangle 24">
+            <a:extLst>
+              <a:ext uri="{FF2B5EF4-FFF2-40B4-BE49-F238E27FC236}">
+                <a16:creationId xmlns:a16="http://schemas.microsoft.com/office/drawing/2014/main" id="{AE875E4E-18A9-8646-85AA-EB7C3B7B565C}"/>
+              </a:ext>
+            </a:extLst>
+          </p:cNvPr>
+          <p:cNvSpPr/>
+          <p:nvPr/>
+        </p:nvSpPr>
+        <p:spPr>
+          <a:xfrm>
+            <a:off x="6270874" y="3749231"/>
+            <a:ext cx="1302037" cy="431515"/>
+          </a:xfrm>
+          <a:prstGeom prst="rect">
+            <a:avLst/>
+          </a:prstGeom>
+          <a:solidFill>
+            <a:schemeClr val="bg1">
+              <a:lumMod val="85000"/>
+            </a:schemeClr>
+          </a:solidFill>
+          <a:ln w="19050">
+            <a:solidFill>
+              <a:schemeClr val="tx1"/>
+            </a:solidFill>
+          </a:ln>
+        </p:spPr>
+        <p:style>
+          <a:lnRef idx="2">
+            <a:schemeClr val="accent1">
+              <a:shade val="50000"/>
+            </a:schemeClr>
+          </a:lnRef>
+          <a:fillRef idx="1">
+            <a:schemeClr val="accent1"/>
+          </a:fillRef>
+          <a:effectRef idx="0">
+            <a:schemeClr val="accent1"/>
+          </a:effectRef>
+          <a:fontRef idx="minor">
+            <a:schemeClr val="lt1"/>
+          </a:fontRef>
+        </p:style>
+        <p:txBody>
+          <a:bodyPr rtlCol="0" anchor="ctr"/>
+          <a:lstStyle/>
+          <a:p>
+            <a:pPr algn="ctr"/>
+            <a:r>
+              <a:rPr lang="en-US" sz="2000" dirty="0">
+                <a:solidFill>
+                  <a:schemeClr val="tx1"/>
+                </a:solidFill>
+              </a:rPr>
+              <a:t>Worker 2</a:t>
+            </a:r>
+          </a:p>
+        </p:txBody>
+      </p:sp>
+      <p:sp>
+        <p:nvSpPr>
+          <p:cNvPr id="26" name="Rectangle 25">
+            <a:extLst>
+              <a:ext uri="{FF2B5EF4-FFF2-40B4-BE49-F238E27FC236}">
+                <a16:creationId xmlns:a16="http://schemas.microsoft.com/office/drawing/2014/main" id="{4F337E31-B681-BC43-AD6F-7E934AA93B4C}"/>
+              </a:ext>
+            </a:extLst>
+          </p:cNvPr>
+          <p:cNvSpPr/>
+          <p:nvPr/>
+        </p:nvSpPr>
+        <p:spPr>
+          <a:xfrm>
+            <a:off x="7697060" y="3749231"/>
+            <a:ext cx="1302037" cy="431515"/>
+          </a:xfrm>
+          <a:prstGeom prst="rect">
+            <a:avLst/>
+          </a:prstGeom>
+          <a:solidFill>
+            <a:schemeClr val="bg1">
+              <a:lumMod val="50000"/>
+            </a:schemeClr>
+          </a:solidFill>
+          <a:ln w="19050">
+            <a:solidFill>
+              <a:schemeClr val="tx1"/>
+            </a:solidFill>
+          </a:ln>
+        </p:spPr>
+        <p:style>
+          <a:lnRef idx="2">
+            <a:schemeClr val="accent1">
+              <a:shade val="50000"/>
+            </a:schemeClr>
+          </a:lnRef>
+          <a:fillRef idx="1">
+            <a:schemeClr val="accent1"/>
+          </a:fillRef>
+          <a:effectRef idx="0">
+            <a:schemeClr val="accent1"/>
+          </a:effectRef>
+          <a:fontRef idx="minor">
+            <a:schemeClr val="lt1"/>
+          </a:fontRef>
+        </p:style>
+        <p:txBody>
+          <a:bodyPr rtlCol="0" anchor="ctr"/>
+          <a:lstStyle/>
+          <a:p>
+            <a:pPr algn="ctr"/>
+            <a:r>
+              <a:rPr lang="en-US" sz="2000" dirty="0">
+                <a:solidFill>
+                  <a:schemeClr val="tx1"/>
+                </a:solidFill>
+              </a:rPr>
+              <a:t>Worker 3</a:t>
+            </a:r>
+          </a:p>
+        </p:txBody>
+      </p:sp>
+      <p:sp>
+        <p:nvSpPr>
+          <p:cNvPr id="27" name="Rectangle 26">
+            <a:extLst>
+              <a:ext uri="{FF2B5EF4-FFF2-40B4-BE49-F238E27FC236}">
+                <a16:creationId xmlns:a16="http://schemas.microsoft.com/office/drawing/2014/main" id="{F318D34B-40DA-0F4F-A298-387F87E4E2F3}"/>
+              </a:ext>
+            </a:extLst>
+          </p:cNvPr>
+          <p:cNvSpPr/>
+          <p:nvPr/>
+        </p:nvSpPr>
+        <p:spPr>
+          <a:xfrm>
+            <a:off x="9112108" y="3749231"/>
+            <a:ext cx="1302037" cy="431515"/>
+          </a:xfrm>
+          <a:prstGeom prst="rect">
+            <a:avLst/>
+          </a:prstGeom>
+          <a:solidFill>
+            <a:schemeClr val="bg1">
+              <a:lumMod val="95000"/>
+            </a:schemeClr>
+          </a:solidFill>
+          <a:ln w="19050">
+            <a:solidFill>
+              <a:schemeClr val="tx1"/>
+            </a:solidFill>
+          </a:ln>
+        </p:spPr>
+        <p:style>
+          <a:lnRef idx="2">
+            <a:schemeClr val="accent1">
+              <a:shade val="50000"/>
+            </a:schemeClr>
+          </a:lnRef>
+          <a:fillRef idx="1">
+            <a:schemeClr val="accent1"/>
+          </a:fillRef>
+          <a:effectRef idx="0">
+            <a:schemeClr val="accent1"/>
+          </a:effectRef>
+          <a:fontRef idx="minor">
+            <a:schemeClr val="lt1"/>
+          </a:fontRef>
+        </p:style>
+        <p:txBody>
+          <a:bodyPr rtlCol="0" anchor="ctr"/>
+          <a:lstStyle/>
+          <a:p>
+            <a:pPr algn="ctr"/>
+            <a:r>
+              <a:rPr lang="en-US" sz="2000" dirty="0">
+                <a:solidFill>
+                  <a:schemeClr val="tx1"/>
+                </a:solidFill>
+              </a:rPr>
+              <a:t>Worker 1</a:t>
+            </a:r>
+          </a:p>
+        </p:txBody>
+      </p:sp>
+      <p:sp>
+        <p:nvSpPr>
+          <p:cNvPr id="29" name="Rectangle 28">
+            <a:extLst>
+              <a:ext uri="{FF2B5EF4-FFF2-40B4-BE49-F238E27FC236}">
+                <a16:creationId xmlns:a16="http://schemas.microsoft.com/office/drawing/2014/main" id="{FF939F75-1CD5-5E42-8F16-BC937A3F9869}"/>
+              </a:ext>
+            </a:extLst>
+          </p:cNvPr>
+          <p:cNvSpPr/>
+          <p:nvPr/>
+        </p:nvSpPr>
+        <p:spPr>
+          <a:xfrm>
+            <a:off x="10499976" y="3749231"/>
+            <a:ext cx="1302037" cy="431515"/>
+          </a:xfrm>
+          <a:prstGeom prst="rect">
+            <a:avLst/>
+          </a:prstGeom>
+          <a:solidFill>
+            <a:schemeClr val="bg1">
+              <a:lumMod val="75000"/>
+            </a:schemeClr>
+          </a:solidFill>
+          <a:ln w="19050">
+            <a:solidFill>
+              <a:schemeClr val="tx1"/>
+            </a:solidFill>
+          </a:ln>
+        </p:spPr>
+        <p:style>
+          <a:lnRef idx="2">
+            <a:schemeClr val="accent1">
+              <a:shade val="50000"/>
+            </a:schemeClr>
+          </a:lnRef>
+          <a:fillRef idx="1">
+            <a:schemeClr val="accent1"/>
+          </a:fillRef>
+          <a:effectRef idx="0">
+            <a:schemeClr val="accent1"/>
+          </a:effectRef>
+          <a:fontRef idx="minor">
+            <a:schemeClr val="lt1"/>
+          </a:fontRef>
+        </p:style>
+        <p:txBody>
+          <a:bodyPr rtlCol="0" anchor="ctr"/>
+          <a:lstStyle/>
+          <a:p>
+            <a:pPr algn="ctr"/>
+            <a:r>
+              <a:rPr lang="en-US" sz="2000" dirty="0">
+                <a:solidFill>
+                  <a:schemeClr val="tx1"/>
+                </a:solidFill>
+              </a:rPr>
+              <a:t>Worker 4 </a:t>
+            </a:r>
+          </a:p>
+        </p:txBody>
+      </p:sp>
+      <p:sp>
+        <p:nvSpPr>
+          <p:cNvPr id="30" name="Rectangle 29">
+            <a:extLst>
+              <a:ext uri="{FF2B5EF4-FFF2-40B4-BE49-F238E27FC236}">
+                <a16:creationId xmlns:a16="http://schemas.microsoft.com/office/drawing/2014/main" id="{FF1D1245-F9B2-7845-BE62-8181C94FE1B0}"/>
+              </a:ext>
+            </a:extLst>
+          </p:cNvPr>
+          <p:cNvSpPr/>
+          <p:nvPr/>
+        </p:nvSpPr>
+        <p:spPr>
+          <a:xfrm>
+            <a:off x="444570" y="5123414"/>
+            <a:ext cx="1702729" cy="431515"/>
+          </a:xfrm>
+          <a:prstGeom prst="rect">
+            <a:avLst/>
+          </a:prstGeom>
+          <a:solidFill>
+            <a:schemeClr val="bg1">
+              <a:lumMod val="95000"/>
+            </a:schemeClr>
+          </a:solidFill>
+          <a:ln w="19050">
+            <a:solidFill>
+              <a:schemeClr val="tx1"/>
+            </a:solidFill>
+          </a:ln>
+        </p:spPr>
+        <p:style>
+          <a:lnRef idx="2">
+            <a:schemeClr val="accent1">
+              <a:shade val="50000"/>
+            </a:schemeClr>
+          </a:lnRef>
+          <a:fillRef idx="1">
+            <a:schemeClr val="accent1"/>
+          </a:fillRef>
+          <a:effectRef idx="0">
+            <a:schemeClr val="accent1"/>
+          </a:effectRef>
+          <a:fontRef idx="minor">
+            <a:schemeClr val="lt1"/>
+          </a:fontRef>
+        </p:style>
+        <p:txBody>
+          <a:bodyPr rtlCol="0" anchor="ctr"/>
+          <a:lstStyle/>
+          <a:p>
+            <a:pPr algn="ctr"/>
+            <a:r>
+              <a:rPr lang="en-US" sz="2000" dirty="0">
+                <a:solidFill>
+                  <a:schemeClr val="tx1"/>
+                </a:solidFill>
+              </a:rPr>
+              <a:t>Worker 1</a:t>
+            </a:r>
+          </a:p>
+        </p:txBody>
+      </p:sp>
+      <p:sp>
+        <p:nvSpPr>
+          <p:cNvPr id="31" name="Rectangle 30">
+            <a:extLst>
+              <a:ext uri="{FF2B5EF4-FFF2-40B4-BE49-F238E27FC236}">
+                <a16:creationId xmlns:a16="http://schemas.microsoft.com/office/drawing/2014/main" id="{3596D639-70C5-9240-8C46-196B529A41B8}"/>
+              </a:ext>
+            </a:extLst>
+          </p:cNvPr>
+          <p:cNvSpPr/>
+          <p:nvPr/>
+        </p:nvSpPr>
+        <p:spPr>
+          <a:xfrm>
+            <a:off x="2289857" y="5123414"/>
+            <a:ext cx="1702729" cy="431515"/>
+          </a:xfrm>
+          <a:prstGeom prst="rect">
+            <a:avLst/>
+          </a:prstGeom>
+          <a:solidFill>
+            <a:schemeClr val="bg1">
+              <a:lumMod val="85000"/>
+            </a:schemeClr>
+          </a:solidFill>
+          <a:ln w="19050">
+            <a:solidFill>
+              <a:schemeClr val="tx1"/>
+            </a:solidFill>
+          </a:ln>
+        </p:spPr>
+        <p:style>
+          <a:lnRef idx="2">
+            <a:schemeClr val="accent1">
+              <a:shade val="50000"/>
+            </a:schemeClr>
+          </a:lnRef>
+          <a:fillRef idx="1">
+            <a:schemeClr val="accent1"/>
+          </a:fillRef>
+          <a:effectRef idx="0">
+            <a:schemeClr val="accent1"/>
+          </a:effectRef>
+          <a:fontRef idx="minor">
+            <a:schemeClr val="lt1"/>
+          </a:fontRef>
+        </p:style>
+        <p:txBody>
+          <a:bodyPr rtlCol="0" anchor="ctr"/>
+          <a:lstStyle/>
+          <a:p>
+            <a:pPr algn="ctr"/>
+            <a:r>
+              <a:rPr lang="en-US" sz="2000" dirty="0">
+                <a:solidFill>
+                  <a:schemeClr val="tx1"/>
+                </a:solidFill>
+              </a:rPr>
+              <a:t>Worker 2</a:t>
+            </a:r>
+          </a:p>
+        </p:txBody>
+      </p:sp>
+      <p:sp>
+        <p:nvSpPr>
+          <p:cNvPr id="32" name="Rectangle 31">
+            <a:extLst>
+              <a:ext uri="{FF2B5EF4-FFF2-40B4-BE49-F238E27FC236}">
+                <a16:creationId xmlns:a16="http://schemas.microsoft.com/office/drawing/2014/main" id="{8984BD35-E475-9A48-B68C-D94E9ECDA7D4}"/>
+              </a:ext>
+            </a:extLst>
+          </p:cNvPr>
+          <p:cNvSpPr/>
+          <p:nvPr/>
+        </p:nvSpPr>
+        <p:spPr>
+          <a:xfrm>
+            <a:off x="4140703" y="5123414"/>
+            <a:ext cx="1702729" cy="431515"/>
+          </a:xfrm>
+          <a:prstGeom prst="rect">
+            <a:avLst/>
+          </a:prstGeom>
+          <a:solidFill>
+            <a:schemeClr val="bg1">
+              <a:lumMod val="75000"/>
+            </a:schemeClr>
+          </a:solidFill>
+          <a:ln w="19050">
+            <a:solidFill>
+              <a:schemeClr val="tx1"/>
+            </a:solidFill>
+          </a:ln>
+        </p:spPr>
+        <p:style>
+          <a:lnRef idx="2">
+            <a:schemeClr val="accent1">
+              <a:shade val="50000"/>
+            </a:schemeClr>
+          </a:lnRef>
+          <a:fillRef idx="1">
+            <a:schemeClr val="accent1"/>
+          </a:fillRef>
+          <a:effectRef idx="0">
+            <a:schemeClr val="accent1"/>
+          </a:effectRef>
+          <a:fontRef idx="minor">
+            <a:schemeClr val="lt1"/>
+          </a:fontRef>
+        </p:style>
+        <p:txBody>
+          <a:bodyPr rtlCol="0" anchor="ctr"/>
+          <a:lstStyle/>
+          <a:p>
+            <a:pPr algn="ctr"/>
+            <a:r>
+              <a:rPr lang="en-US" sz="2000" dirty="0">
+                <a:solidFill>
+                  <a:schemeClr val="tx1"/>
+                </a:solidFill>
+              </a:rPr>
+              <a:t>Worker 3</a:t>
+            </a:r>
+          </a:p>
+        </p:txBody>
+      </p:sp>
+      <p:sp>
+        <p:nvSpPr>
+          <p:cNvPr id="33" name="Rectangle 32">
+            <a:extLst>
+              <a:ext uri="{FF2B5EF4-FFF2-40B4-BE49-F238E27FC236}">
+                <a16:creationId xmlns:a16="http://schemas.microsoft.com/office/drawing/2014/main" id="{6414211E-54BC-C549-932C-10A1DE996EE8}"/>
+              </a:ext>
+            </a:extLst>
+          </p:cNvPr>
+          <p:cNvSpPr/>
+          <p:nvPr/>
+        </p:nvSpPr>
+        <p:spPr>
+          <a:xfrm>
+            <a:off x="5985990" y="5123414"/>
+            <a:ext cx="1702729" cy="431515"/>
+          </a:xfrm>
+          <a:prstGeom prst="rect">
+            <a:avLst/>
+          </a:prstGeom>
+          <a:solidFill>
+            <a:schemeClr val="bg1">
+              <a:lumMod val="50000"/>
+            </a:schemeClr>
+          </a:solidFill>
+          <a:ln w="19050">
+            <a:solidFill>
+              <a:schemeClr val="tx1"/>
+            </a:solidFill>
+          </a:ln>
+        </p:spPr>
+        <p:style>
+          <a:lnRef idx="2">
+            <a:schemeClr val="accent1">
+              <a:shade val="50000"/>
+            </a:schemeClr>
+          </a:lnRef>
+          <a:fillRef idx="1">
+            <a:schemeClr val="accent1"/>
+          </a:fillRef>
+          <a:effectRef idx="0">
+            <a:schemeClr val="accent1"/>
+          </a:effectRef>
+          <a:fontRef idx="minor">
+            <a:schemeClr val="lt1"/>
+          </a:fontRef>
+        </p:style>
+        <p:txBody>
+          <a:bodyPr rtlCol="0" anchor="ctr"/>
+          <a:lstStyle/>
+          <a:p>
+            <a:pPr algn="ctr"/>
+            <a:r>
+              <a:rPr lang="en-US" sz="2000" dirty="0">
+                <a:solidFill>
+                  <a:schemeClr val="tx1"/>
+                </a:solidFill>
+              </a:rPr>
+              <a:t>Worker 4</a:t>
+            </a:r>
+          </a:p>
+        </p:txBody>
+      </p:sp>
+      <p:sp>
+        <p:nvSpPr>
+          <p:cNvPr id="34" name="Rectangle 33">
+            <a:extLst>
+              <a:ext uri="{FF2B5EF4-FFF2-40B4-BE49-F238E27FC236}">
+                <a16:creationId xmlns:a16="http://schemas.microsoft.com/office/drawing/2014/main" id="{074B3009-B4C5-1442-87A4-0B0AA494D00C}"/>
+              </a:ext>
+            </a:extLst>
+          </p:cNvPr>
+          <p:cNvSpPr/>
+          <p:nvPr/>
+        </p:nvSpPr>
+        <p:spPr>
+          <a:xfrm>
+            <a:off x="7821099" y="5123414"/>
+            <a:ext cx="881226" cy="431515"/>
+          </a:xfrm>
+          <a:prstGeom prst="rect">
+            <a:avLst/>
+          </a:prstGeom>
+          <a:solidFill>
+            <a:schemeClr val="bg1">
+              <a:lumMod val="95000"/>
+            </a:schemeClr>
+          </a:solidFill>
+          <a:ln w="19050">
+            <a:solidFill>
+              <a:schemeClr val="tx1"/>
+            </a:solidFill>
+          </a:ln>
+        </p:spPr>
+        <p:style>
+          <a:lnRef idx="2">
+            <a:schemeClr val="accent1">
+              <a:shade val="50000"/>
+            </a:schemeClr>
+          </a:lnRef>
+          <a:fillRef idx="1">
+            <a:schemeClr val="accent1"/>
+          </a:fillRef>
+          <a:effectRef idx="0">
+            <a:schemeClr val="accent1"/>
+          </a:effectRef>
+          <a:fontRef idx="minor">
+            <a:schemeClr val="lt1"/>
+          </a:fontRef>
+        </p:style>
+        <p:txBody>
+          <a:bodyPr rtlCol="0" anchor="ctr"/>
+          <a:lstStyle/>
+          <a:p>
+            <a:pPr algn="ctr"/>
+            <a:r>
+              <a:rPr lang="en-US" sz="1400" dirty="0">
+                <a:solidFill>
+                  <a:schemeClr val="tx1"/>
+                </a:solidFill>
+              </a:rPr>
+              <a:t>Worker 1</a:t>
+            </a:r>
+          </a:p>
+        </p:txBody>
+      </p:sp>
+      <p:sp>
+        <p:nvSpPr>
+          <p:cNvPr id="35" name="Rectangle 34">
+            <a:extLst>
+              <a:ext uri="{FF2B5EF4-FFF2-40B4-BE49-F238E27FC236}">
+                <a16:creationId xmlns:a16="http://schemas.microsoft.com/office/drawing/2014/main" id="{A23370AF-C825-2C42-AC12-7612DC3505A8}"/>
+              </a:ext>
+            </a:extLst>
+          </p:cNvPr>
+          <p:cNvSpPr/>
+          <p:nvPr/>
+        </p:nvSpPr>
+        <p:spPr>
+          <a:xfrm>
+            <a:off x="8847987" y="5123414"/>
+            <a:ext cx="881226" cy="431515"/>
+          </a:xfrm>
+          <a:prstGeom prst="rect">
+            <a:avLst/>
+          </a:prstGeom>
+          <a:solidFill>
+            <a:schemeClr val="bg1">
+              <a:lumMod val="85000"/>
+            </a:schemeClr>
+          </a:solidFill>
+          <a:ln w="19050">
+            <a:solidFill>
+              <a:schemeClr val="tx1"/>
+            </a:solidFill>
+          </a:ln>
+        </p:spPr>
+        <p:style>
+          <a:lnRef idx="2">
+            <a:schemeClr val="accent1">
+              <a:shade val="50000"/>
+            </a:schemeClr>
+          </a:lnRef>
+          <a:fillRef idx="1">
+            <a:schemeClr val="accent1"/>
+          </a:fillRef>
+          <a:effectRef idx="0">
+            <a:schemeClr val="accent1"/>
+          </a:effectRef>
+          <a:fontRef idx="minor">
+            <a:schemeClr val="lt1"/>
+          </a:fontRef>
+        </p:style>
+        <p:txBody>
+          <a:bodyPr rtlCol="0" anchor="ctr"/>
+          <a:lstStyle/>
+          <a:p>
+            <a:pPr algn="ctr"/>
+            <a:r>
+              <a:rPr lang="en-US" sz="1400" dirty="0">
+                <a:solidFill>
+                  <a:schemeClr val="tx1"/>
+                </a:solidFill>
+              </a:rPr>
+              <a:t>Worker 2</a:t>
+            </a:r>
+          </a:p>
+        </p:txBody>
+      </p:sp>
+      <p:sp>
+        <p:nvSpPr>
+          <p:cNvPr id="38" name="Rectangle 37">
+            <a:extLst>
+              <a:ext uri="{FF2B5EF4-FFF2-40B4-BE49-F238E27FC236}">
+                <a16:creationId xmlns:a16="http://schemas.microsoft.com/office/drawing/2014/main" id="{E0923C05-C910-3B42-B647-994A9B068CDE}"/>
+              </a:ext>
+            </a:extLst>
+          </p:cNvPr>
+          <p:cNvSpPr/>
+          <p:nvPr/>
+        </p:nvSpPr>
+        <p:spPr>
+          <a:xfrm>
+            <a:off x="9902143" y="5123414"/>
+            <a:ext cx="973708" cy="431515"/>
+          </a:xfrm>
+          <a:prstGeom prst="rect">
+            <a:avLst/>
+          </a:prstGeom>
+          <a:solidFill>
+            <a:schemeClr val="bg1">
+              <a:lumMod val="50000"/>
+            </a:schemeClr>
+          </a:solidFill>
+          <a:ln w="19050">
+            <a:solidFill>
+              <a:schemeClr val="tx1"/>
+            </a:solidFill>
+          </a:ln>
+        </p:spPr>
+        <p:style>
+          <a:lnRef idx="2">
+            <a:schemeClr val="accent1">
+              <a:shade val="50000"/>
+            </a:schemeClr>
+          </a:lnRef>
+          <a:fillRef idx="1">
+            <a:schemeClr val="accent1"/>
+          </a:fillRef>
+          <a:effectRef idx="0">
+            <a:schemeClr val="accent1"/>
+          </a:effectRef>
+          <a:fontRef idx="minor">
+            <a:schemeClr val="lt1"/>
+          </a:fontRef>
+        </p:style>
+        <p:txBody>
+          <a:bodyPr rtlCol="0" anchor="ctr"/>
+          <a:lstStyle/>
+          <a:p>
+            <a:pPr algn="ctr"/>
+            <a:r>
+              <a:rPr lang="en-US" sz="1600" dirty="0">
+                <a:solidFill>
+                  <a:schemeClr val="tx1"/>
+                </a:solidFill>
+              </a:rPr>
+              <a:t>Worker 4</a:t>
+            </a:r>
+          </a:p>
+        </p:txBody>
+      </p:sp>
+      <p:sp>
+        <p:nvSpPr>
+          <p:cNvPr id="40" name="Rectangle 39">
+            <a:extLst>
+              <a:ext uri="{FF2B5EF4-FFF2-40B4-BE49-F238E27FC236}">
+                <a16:creationId xmlns:a16="http://schemas.microsoft.com/office/drawing/2014/main" id="{DA70811D-F871-FC4B-A2B7-00C991D979F3}"/>
+              </a:ext>
+            </a:extLst>
+          </p:cNvPr>
+          <p:cNvSpPr/>
+          <p:nvPr/>
+        </p:nvSpPr>
+        <p:spPr>
+          <a:xfrm>
+            <a:off x="11511673" y="5123414"/>
+            <a:ext cx="290340" cy="431515"/>
+          </a:xfrm>
+          <a:prstGeom prst="rect">
+            <a:avLst/>
+          </a:prstGeom>
+          <a:solidFill>
+            <a:schemeClr val="bg1">
+              <a:lumMod val="95000"/>
+            </a:schemeClr>
+          </a:solidFill>
+          <a:ln w="19050">
+            <a:solidFill>
+              <a:schemeClr val="tx1"/>
+            </a:solidFill>
+          </a:ln>
+        </p:spPr>
+        <p:style>
+          <a:lnRef idx="2">
+            <a:schemeClr val="accent1">
+              <a:shade val="50000"/>
+            </a:schemeClr>
+          </a:lnRef>
+          <a:fillRef idx="1">
+            <a:schemeClr val="accent1"/>
+          </a:fillRef>
+          <a:effectRef idx="0">
+            <a:schemeClr val="accent1"/>
+          </a:effectRef>
+          <a:fontRef idx="minor">
+            <a:schemeClr val="lt1"/>
+          </a:fontRef>
+        </p:style>
+        <p:txBody>
+          <a:bodyPr rtlCol="0" anchor="ctr"/>
+          <a:lstStyle/>
+          <a:p>
+            <a:pPr algn="ctr"/>
+            <a:r>
+              <a:rPr lang="en-US" sz="2000" dirty="0">
+                <a:solidFill>
+                  <a:schemeClr val="tx1"/>
+                </a:solidFill>
+              </a:rPr>
+              <a:t>…</a:t>
+            </a:r>
           </a:p>
         </p:txBody>
       </p:sp>
@@ -5498,6 +5435,69 @@
           <a:p>
             <a:pPr algn="ctr"/>
             <a:endParaRPr lang="en-US" dirty="0"/>
+          </a:p>
+        </p:txBody>
+      </p:sp>
+      <p:sp>
+        <p:nvSpPr>
+          <p:cNvPr id="37" name="Rectangle 36">
+            <a:extLst>
+              <a:ext uri="{FF2B5EF4-FFF2-40B4-BE49-F238E27FC236}">
+                <a16:creationId xmlns:a16="http://schemas.microsoft.com/office/drawing/2014/main" id="{79BDF9C7-F49E-EB4F-A0F2-CB7287F2CC59}"/>
+              </a:ext>
+            </a:extLst>
+          </p:cNvPr>
+          <p:cNvSpPr/>
+          <p:nvPr/>
+        </p:nvSpPr>
+        <p:spPr>
+          <a:xfrm>
+            <a:off x="11045170" y="5123413"/>
+            <a:ext cx="290340" cy="431515"/>
+          </a:xfrm>
+          <a:prstGeom prst="rect">
+            <a:avLst/>
+          </a:prstGeom>
+          <a:solidFill>
+            <a:schemeClr val="bg1">
+              <a:lumMod val="95000"/>
+            </a:schemeClr>
+          </a:solidFill>
+          <a:ln w="19050">
+            <a:solidFill>
+              <a:schemeClr val="tx1"/>
+            </a:solidFill>
+          </a:ln>
+        </p:spPr>
+        <p:style>
+          <a:lnRef idx="2">
+            <a:schemeClr val="accent1">
+              <a:shade val="50000"/>
+            </a:schemeClr>
+          </a:lnRef>
+          <a:fillRef idx="1">
+            <a:schemeClr val="accent1"/>
+          </a:fillRef>
+          <a:effectRef idx="0">
+            <a:schemeClr val="accent1"/>
+          </a:effectRef>
+          <a:fontRef idx="minor">
+            <a:schemeClr val="lt1"/>
+          </a:fontRef>
+        </p:style>
+        <p:txBody>
+          <a:bodyPr rtlCol="0" anchor="ctr"/>
+          <a:lstStyle/>
+          <a:p>
+            <a:pPr algn="ctr"/>
+            <a:r>
+              <a:rPr lang="en-US" sz="2000" dirty="0">
+                <a:solidFill>
+                  <a:schemeClr val="tx1"/>
+                </a:solidFill>
+              </a:rPr>
+              <a:t>…</a:t>
+            </a:r>
           </a:p>
         </p:txBody>
       </p:sp>

</xml_diff>